<commit_message>
fix overview slides [2]
- incorporated Intel feedback
- taken care of of copyright signs
</commit_message>
<xml_diff>
--- a/slides/1-Analytics-Zoo-Overview.pptx
+++ b/slides/1-Analytics-Zoo-Overview.pptx
@@ -212,6 +212,13 @@
       </p:ext>
     </p:extLst>
   </p:cmAuthor>
+  <p:cmAuthor id="9" name="Babits, LilliX" initials="BL" lastIdx="22" clrIdx="9">
+    <p:extLst>
+      <p:ext uri="{19B8F6BF-5375-455C-9EA6-DF929625EA0E}">
+        <p15:presenceInfo xmlns:p15="http://schemas.microsoft.com/office/powerpoint/2012/main" userId="S-1-5-21-725345543-602162358-527237240-3228586" providerId="AD"/>
+      </p:ext>
+    </p:extLst>
+  </p:cmAuthor>
   <p:cmAuthor id="6" name="Tehra Peace" initials="TP" lastIdx="126" clrIdx="6">
     <p:extLst>
       <p:ext uri="{19B8F6BF-5375-455C-9EA6-DF929625EA0E}">
@@ -309,7 +316,7 @@
                 <a:latin typeface="Intel Clear"/>
               </a:rPr>
               <a:pPr/>
-              <a:t>5/2/19</a:t>
+              <a:t>5/16/19</a:t>
             </a:fld>
             <a:endParaRPr lang="en-US" dirty="0">
               <a:latin typeface="Intel Clear"/>
@@ -489,7 +496,7 @@
             <a:fld id="{ED7FC5FE-6F0D-D34A-8EE6-C95B4F5F4DC8}" type="datetimeFigureOut">
               <a:rPr lang="en-US" smtClean="0"/>
               <a:pPr/>
-              <a:t>5/2/19</a:t>
+              <a:t>5/16/19</a:t>
             </a:fld>
             <a:endParaRPr lang="en-US" dirty="0"/>
           </a:p>
@@ -1267,6 +1274,176 @@
             <p:ph type="sldImg"/>
           </p:nvPr>
         </p:nvSpPr>
+        <p:spPr/>
+      </p:sp>
+      <p:sp>
+        <p:nvSpPr>
+          <p:cNvPr id="3" name="Notes Placeholder 2"/>
+          <p:cNvSpPr>
+            <a:spLocks noGrp="1"/>
+          </p:cNvSpPr>
+          <p:nvPr>
+            <p:ph type="body" idx="1"/>
+          </p:nvPr>
+        </p:nvSpPr>
+        <p:spPr/>
+        <p:txBody>
+          <a:bodyPr/>
+          <a:lstStyle/>
+          <a:p>
+            <a:endParaRPr lang="en-US"/>
+          </a:p>
+        </p:txBody>
+      </p:sp>
+      <p:sp>
+        <p:nvSpPr>
+          <p:cNvPr id="4" name="Slide Number Placeholder 3"/>
+          <p:cNvSpPr>
+            <a:spLocks noGrp="1"/>
+          </p:cNvSpPr>
+          <p:nvPr>
+            <p:ph type="sldNum" sz="quarter" idx="10"/>
+          </p:nvPr>
+        </p:nvSpPr>
+        <p:spPr/>
+        <p:txBody>
+          <a:bodyPr/>
+          <a:lstStyle/>
+          <a:p>
+            <a:fld id="{D61C8689-8455-3546-ADF9-3B7273760F66}" type="slidenum">
+              <a:rPr lang="en-US" smtClean="0"/>
+              <a:pPr/>
+              <a:t>13</a:t>
+            </a:fld>
+            <a:endParaRPr lang="en-US" dirty="0"/>
+          </a:p>
+        </p:txBody>
+      </p:sp>
+    </p:spTree>
+    <p:extLst>
+      <p:ext uri="{BB962C8B-B14F-4D97-AF65-F5344CB8AC3E}">
+        <p14:creationId xmlns:p14="http://schemas.microsoft.com/office/powerpoint/2010/main" val="794815734"/>
+      </p:ext>
+    </p:extLst>
+  </p:cSld>
+  <p:clrMapOvr>
+    <a:masterClrMapping/>
+  </p:clrMapOvr>
+</p:notes>
+</file>
+
+<file path=ppt/notesSlides/notesSlide6.xml><?xml version="1.0" encoding="utf-8"?>
+<p:notes xmlns:a="http://schemas.openxmlformats.org/drawingml/2006/main" xmlns:r="http://schemas.openxmlformats.org/officeDocument/2006/relationships" xmlns:p="http://schemas.openxmlformats.org/presentationml/2006/main">
+  <p:cSld>
+    <p:spTree>
+      <p:nvGrpSpPr>
+        <p:cNvPr id="1" name=""/>
+        <p:cNvGrpSpPr/>
+        <p:nvPr/>
+      </p:nvGrpSpPr>
+      <p:grpSpPr>
+        <a:xfrm>
+          <a:off x="0" y="0"/>
+          <a:ext cx="0" cy="0"/>
+          <a:chOff x="0" y="0"/>
+          <a:chExt cx="0" cy="0"/>
+        </a:xfrm>
+      </p:grpSpPr>
+      <p:sp>
+        <p:nvSpPr>
+          <p:cNvPr id="2" name="Slide Image Placeholder 1"/>
+          <p:cNvSpPr>
+            <a:spLocks noGrp="1" noRot="1" noChangeAspect="1"/>
+          </p:cNvSpPr>
+          <p:nvPr>
+            <p:ph type="sldImg"/>
+          </p:nvPr>
+        </p:nvSpPr>
+        <p:spPr/>
+      </p:sp>
+      <p:sp>
+        <p:nvSpPr>
+          <p:cNvPr id="3" name="Notes Placeholder 2"/>
+          <p:cNvSpPr>
+            <a:spLocks noGrp="1"/>
+          </p:cNvSpPr>
+          <p:nvPr>
+            <p:ph type="body" idx="1"/>
+          </p:nvPr>
+        </p:nvSpPr>
+        <p:spPr/>
+        <p:txBody>
+          <a:bodyPr/>
+          <a:lstStyle/>
+          <a:p>
+            <a:endParaRPr lang="en-US"/>
+          </a:p>
+        </p:txBody>
+      </p:sp>
+      <p:sp>
+        <p:nvSpPr>
+          <p:cNvPr id="4" name="Slide Number Placeholder 3"/>
+          <p:cNvSpPr>
+            <a:spLocks noGrp="1"/>
+          </p:cNvSpPr>
+          <p:nvPr>
+            <p:ph type="sldNum" sz="quarter" idx="10"/>
+          </p:nvPr>
+        </p:nvSpPr>
+        <p:spPr/>
+        <p:txBody>
+          <a:bodyPr/>
+          <a:lstStyle/>
+          <a:p>
+            <a:fld id="{D61C8689-8455-3546-ADF9-3B7273760F66}" type="slidenum">
+              <a:rPr lang="en-US" smtClean="0"/>
+              <a:pPr/>
+              <a:t>14</a:t>
+            </a:fld>
+            <a:endParaRPr lang="en-US" dirty="0"/>
+          </a:p>
+        </p:txBody>
+      </p:sp>
+    </p:spTree>
+    <p:extLst>
+      <p:ext uri="{BB962C8B-B14F-4D97-AF65-F5344CB8AC3E}">
+        <p14:creationId xmlns:p14="http://schemas.microsoft.com/office/powerpoint/2010/main" val="1461119373"/>
+      </p:ext>
+    </p:extLst>
+  </p:cSld>
+  <p:clrMapOvr>
+    <a:masterClrMapping/>
+  </p:clrMapOvr>
+</p:notes>
+</file>
+
+<file path=ppt/notesSlides/notesSlide7.xml><?xml version="1.0" encoding="utf-8"?>
+<p:notes xmlns:a="http://schemas.openxmlformats.org/drawingml/2006/main" xmlns:r="http://schemas.openxmlformats.org/officeDocument/2006/relationships" xmlns:p="http://schemas.openxmlformats.org/presentationml/2006/main">
+  <p:cSld>
+    <p:spTree>
+      <p:nvGrpSpPr>
+        <p:cNvPr id="1" name=""/>
+        <p:cNvGrpSpPr/>
+        <p:nvPr/>
+      </p:nvGrpSpPr>
+      <p:grpSpPr>
+        <a:xfrm>
+          <a:off x="0" y="0"/>
+          <a:ext cx="0" cy="0"/>
+          <a:chOff x="0" y="0"/>
+          <a:chExt cx="0" cy="0"/>
+        </a:xfrm>
+      </p:grpSpPr>
+      <p:sp>
+        <p:nvSpPr>
+          <p:cNvPr id="2" name="Slide Image Placeholder 1"/>
+          <p:cNvSpPr>
+            <a:spLocks noGrp="1" noRot="1" noChangeAspect="1"/>
+          </p:cNvSpPr>
+          <p:nvPr>
+            <p:ph type="sldImg"/>
+          </p:nvPr>
+        </p:nvSpPr>
         <p:spPr>
           <a:xfrm>
             <a:off x="381000" y="685800"/>
@@ -1330,7 +1507,92 @@
 </p:notes>
 </file>
 
-<file path=ppt/notesSlides/notesSlide6.xml><?xml version="1.0" encoding="utf-8"?>
+<file path=ppt/notesSlides/notesSlide8.xml><?xml version="1.0" encoding="utf-8"?>
+<p:notes xmlns:a="http://schemas.openxmlformats.org/drawingml/2006/main" xmlns:r="http://schemas.openxmlformats.org/officeDocument/2006/relationships" xmlns:p="http://schemas.openxmlformats.org/presentationml/2006/main">
+  <p:cSld>
+    <p:spTree>
+      <p:nvGrpSpPr>
+        <p:cNvPr id="1" name=""/>
+        <p:cNvGrpSpPr/>
+        <p:nvPr/>
+      </p:nvGrpSpPr>
+      <p:grpSpPr>
+        <a:xfrm>
+          <a:off x="0" y="0"/>
+          <a:ext cx="0" cy="0"/>
+          <a:chOff x="0" y="0"/>
+          <a:chExt cx="0" cy="0"/>
+        </a:xfrm>
+      </p:grpSpPr>
+      <p:sp>
+        <p:nvSpPr>
+          <p:cNvPr id="2" name="Slide Image Placeholder 1"/>
+          <p:cNvSpPr>
+            <a:spLocks noGrp="1" noRot="1" noChangeAspect="1"/>
+          </p:cNvSpPr>
+          <p:nvPr>
+            <p:ph type="sldImg"/>
+          </p:nvPr>
+        </p:nvSpPr>
+        <p:spPr/>
+      </p:sp>
+      <p:sp>
+        <p:nvSpPr>
+          <p:cNvPr id="3" name="Notes Placeholder 2"/>
+          <p:cNvSpPr>
+            <a:spLocks noGrp="1"/>
+          </p:cNvSpPr>
+          <p:nvPr>
+            <p:ph type="body" idx="1"/>
+          </p:nvPr>
+        </p:nvSpPr>
+        <p:spPr/>
+        <p:txBody>
+          <a:bodyPr/>
+          <a:lstStyle/>
+          <a:p>
+            <a:endParaRPr lang="en-US"/>
+          </a:p>
+        </p:txBody>
+      </p:sp>
+      <p:sp>
+        <p:nvSpPr>
+          <p:cNvPr id="4" name="Slide Number Placeholder 3"/>
+          <p:cNvSpPr>
+            <a:spLocks noGrp="1"/>
+          </p:cNvSpPr>
+          <p:nvPr>
+            <p:ph type="sldNum" sz="quarter" idx="10"/>
+          </p:nvPr>
+        </p:nvSpPr>
+        <p:spPr/>
+        <p:txBody>
+          <a:bodyPr/>
+          <a:lstStyle/>
+          <a:p>
+            <a:fld id="{D61C8689-8455-3546-ADF9-3B7273760F66}" type="slidenum">
+              <a:rPr lang="en-US" smtClean="0"/>
+              <a:pPr/>
+              <a:t>26</a:t>
+            </a:fld>
+            <a:endParaRPr lang="en-US" dirty="0"/>
+          </a:p>
+        </p:txBody>
+      </p:sp>
+    </p:spTree>
+    <p:extLst>
+      <p:ext uri="{BB962C8B-B14F-4D97-AF65-F5344CB8AC3E}">
+        <p14:creationId xmlns:p14="http://schemas.microsoft.com/office/powerpoint/2010/main" val="4092133638"/>
+      </p:ext>
+    </p:extLst>
+  </p:cSld>
+  <p:clrMapOvr>
+    <a:masterClrMapping/>
+  </p:clrMapOvr>
+</p:notes>
+</file>
+
+<file path=ppt/notesSlides/notesSlide9.xml><?xml version="1.0" encoding="utf-8"?>
 <p:notes xmlns:a="http://schemas.openxmlformats.org/drawingml/2006/main" xmlns:r="http://schemas.openxmlformats.org/officeDocument/2006/relationships" xmlns:p="http://schemas.openxmlformats.org/presentationml/2006/main">
   <p:cSld>
     <p:spTree>
@@ -2602,63 +2864,6 @@
           </a:fontRef>
         </p:style>
       </p:cxnSp>
-      <p:sp>
-        <p:nvSpPr>
-          <p:cNvPr id="8" name="Shape 8">
-            <a:extLst>
-              <a:ext uri="{FF2B5EF4-FFF2-40B4-BE49-F238E27FC236}">
-                <a16:creationId xmlns:a16="http://schemas.microsoft.com/office/drawing/2014/main" id="{AD40D931-6E43-D04E-8A43-3ABDF25C84F8}"/>
-              </a:ext>
-            </a:extLst>
-          </p:cNvPr>
-          <p:cNvSpPr/>
-          <p:nvPr userDrawn="1"/>
-        </p:nvSpPr>
-        <p:spPr>
-          <a:xfrm>
-            <a:off x="299668" y="4889921"/>
-            <a:ext cx="1458733" cy="107722"/>
-          </a:xfrm>
-          <a:prstGeom prst="rect">
-            <a:avLst/>
-          </a:prstGeom>
-          <a:ln w="12700">
-            <a:miter lim="400000"/>
-          </a:ln>
-          <a:extLst>
-            <a:ext uri="{C572A759-6A51-4108-AA02-DFA0A04FC94B}">
-              <ma14:wrappingTextBoxFlag xmlns:ma14="http://schemas.microsoft.com/office/mac/drawingml/2011/main" xmlns="" val="1"/>
-            </a:ext>
-          </a:extLst>
-        </p:spPr>
-        <p:txBody>
-          <a:bodyPr wrap="none" lIns="0" tIns="0" rIns="0" bIns="0">
-            <a:spAutoFit/>
-          </a:bodyPr>
-          <a:lstStyle>
-            <a:lvl1pPr>
-              <a:spcBef>
-                <a:spcPts val="0"/>
-              </a:spcBef>
-              <a:defRPr sz="1400">
-                <a:solidFill>
-                  <a:srgbClr val="FFFFFF"/>
-                </a:solidFill>
-              </a:defRPr>
-            </a:lvl1pPr>
-          </a:lstStyle>
-          <a:p>
-            <a:r>
-              <a:rPr lang="en-US" sz="700" b="1" dirty="0">
-                <a:solidFill>
-                  <a:schemeClr val="bg1"/>
-                </a:solidFill>
-              </a:rPr>
-              <a:t>Intel Confidential—Subject to NDA</a:t>
-            </a:r>
-          </a:p>
-        </p:txBody>
-      </p:sp>
       <p:cxnSp>
         <p:nvCxnSpPr>
           <p:cNvPr id="9" name="Straight Connector 8">
@@ -3761,63 +3966,6 @@
           </a:fontRef>
         </p:style>
       </p:cxnSp>
-      <p:sp>
-        <p:nvSpPr>
-          <p:cNvPr id="8" name="Shape 8">
-            <a:extLst>
-              <a:ext uri="{FF2B5EF4-FFF2-40B4-BE49-F238E27FC236}">
-                <a16:creationId xmlns:a16="http://schemas.microsoft.com/office/drawing/2014/main" id="{AD40D931-6E43-D04E-8A43-3ABDF25C84F8}"/>
-              </a:ext>
-            </a:extLst>
-          </p:cNvPr>
-          <p:cNvSpPr/>
-          <p:nvPr userDrawn="1"/>
-        </p:nvSpPr>
-        <p:spPr>
-          <a:xfrm>
-            <a:off x="299668" y="4889921"/>
-            <a:ext cx="1458733" cy="107722"/>
-          </a:xfrm>
-          <a:prstGeom prst="rect">
-            <a:avLst/>
-          </a:prstGeom>
-          <a:ln w="12700">
-            <a:miter lim="400000"/>
-          </a:ln>
-          <a:extLst>
-            <a:ext uri="{C572A759-6A51-4108-AA02-DFA0A04FC94B}">
-              <ma14:wrappingTextBoxFlag xmlns:ma14="http://schemas.microsoft.com/office/mac/drawingml/2011/main" xmlns="" val="1"/>
-            </a:ext>
-          </a:extLst>
-        </p:spPr>
-        <p:txBody>
-          <a:bodyPr wrap="none" lIns="0" tIns="0" rIns="0" bIns="0">
-            <a:spAutoFit/>
-          </a:bodyPr>
-          <a:lstStyle>
-            <a:lvl1pPr>
-              <a:spcBef>
-                <a:spcPts val="0"/>
-              </a:spcBef>
-              <a:defRPr sz="1400">
-                <a:solidFill>
-                  <a:srgbClr val="FFFFFF"/>
-                </a:solidFill>
-              </a:defRPr>
-            </a:lvl1pPr>
-          </a:lstStyle>
-          <a:p>
-            <a:r>
-              <a:rPr lang="en-US" sz="700" b="1" dirty="0">
-                <a:solidFill>
-                  <a:schemeClr val="bg1"/>
-                </a:solidFill>
-              </a:rPr>
-              <a:t>Intel Confidential—Subject to NDA</a:t>
-            </a:r>
-          </a:p>
-        </p:txBody>
-      </p:sp>
       <p:cxnSp>
         <p:nvCxnSpPr>
           <p:cNvPr id="9" name="Straight Connector 8">
@@ -7127,63 +7275,6 @@
           </a:fontRef>
         </p:style>
       </p:cxnSp>
-      <p:sp>
-        <p:nvSpPr>
-          <p:cNvPr id="12" name="Shape 8">
-            <a:extLst>
-              <a:ext uri="{FF2B5EF4-FFF2-40B4-BE49-F238E27FC236}">
-                <a16:creationId xmlns:a16="http://schemas.microsoft.com/office/drawing/2014/main" id="{AF097834-9C2A-5F4F-B796-A2C40E551B21}"/>
-              </a:ext>
-            </a:extLst>
-          </p:cNvPr>
-          <p:cNvSpPr/>
-          <p:nvPr userDrawn="1"/>
-        </p:nvSpPr>
-        <p:spPr>
-          <a:xfrm>
-            <a:off x="299668" y="4889921"/>
-            <a:ext cx="1458733" cy="107722"/>
-          </a:xfrm>
-          <a:prstGeom prst="rect">
-            <a:avLst/>
-          </a:prstGeom>
-          <a:ln w="12700">
-            <a:miter lim="400000"/>
-          </a:ln>
-          <a:extLst>
-            <a:ext uri="{C572A759-6A51-4108-AA02-DFA0A04FC94B}">
-              <ma14:wrappingTextBoxFlag xmlns:ma14="http://schemas.microsoft.com/office/mac/drawingml/2011/main" xmlns="" val="1"/>
-            </a:ext>
-          </a:extLst>
-        </p:spPr>
-        <p:txBody>
-          <a:bodyPr wrap="none" lIns="0" tIns="0" rIns="0" bIns="0">
-            <a:spAutoFit/>
-          </a:bodyPr>
-          <a:lstStyle>
-            <a:lvl1pPr>
-              <a:spcBef>
-                <a:spcPts val="0"/>
-              </a:spcBef>
-              <a:defRPr sz="1400">
-                <a:solidFill>
-                  <a:srgbClr val="FFFFFF"/>
-                </a:solidFill>
-              </a:defRPr>
-            </a:lvl1pPr>
-          </a:lstStyle>
-          <a:p>
-            <a:r>
-              <a:rPr lang="en-US" sz="700" b="1" dirty="0">
-                <a:solidFill>
-                  <a:schemeClr val="bg1"/>
-                </a:solidFill>
-              </a:rPr>
-              <a:t>Intel Confidential—Subject to NDA</a:t>
-            </a:r>
-          </a:p>
-        </p:txBody>
-      </p:sp>
       <p:cxnSp>
         <p:nvCxnSpPr>
           <p:cNvPr id="13" name="Straight Connector 12">
@@ -7719,8 +7810,8 @@
         </p:nvSpPr>
         <p:spPr>
           <a:xfrm>
-            <a:off x="3200401" y="2045369"/>
-            <a:ext cx="5634916" cy="1102519"/>
+            <a:off x="4317102" y="3309856"/>
+            <a:ext cx="3297503" cy="765372"/>
           </a:xfrm>
         </p:spPr>
         <p:txBody>
@@ -7738,7 +7829,7 @@
             </a:pPr>
             <a:r>
               <a:rPr lang="en-US" dirty="0"/>
-              <a:t>Analytics zoo overview</a:t>
+              <a:t>Overview</a:t>
             </a:r>
           </a:p>
         </p:txBody>
@@ -7782,7 +7873,7 @@
                 </a:solidFill>
                 <a:cs typeface="+mn-cs"/>
               </a:rPr>
-              <a:t>Module 6</a:t>
+              <a:t>Module 1</a:t>
             </a:r>
           </a:p>
           <a:p>
@@ -7790,6 +7881,36 @@
           </a:p>
         </p:txBody>
       </p:sp>
+      <p:pic>
+        <p:nvPicPr>
+          <p:cNvPr id="4" name="Picture 3">
+            <a:extLst>
+              <a:ext uri="{FF2B5EF4-FFF2-40B4-BE49-F238E27FC236}">
+                <a16:creationId xmlns:a16="http://schemas.microsoft.com/office/drawing/2014/main" id="{80CD6D76-A9D0-7741-9751-692A7465DA40}"/>
+              </a:ext>
+            </a:extLst>
+          </p:cNvPr>
+          <p:cNvPicPr>
+            <a:picLocks noChangeAspect="1"/>
+          </p:cNvPicPr>
+          <p:nvPr/>
+        </p:nvPicPr>
+        <p:blipFill>
+          <a:blip r:embed="rId3"/>
+          <a:stretch>
+            <a:fillRect/>
+          </a:stretch>
+        </p:blipFill>
+        <p:spPr>
+          <a:xfrm>
+            <a:off x="3858601" y="944524"/>
+            <a:ext cx="3998765" cy="2749817"/>
+          </a:xfrm>
+          <a:prstGeom prst="rect">
+            <a:avLst/>
+          </a:prstGeom>
+        </p:spPr>
+      </p:pic>
     </p:spTree>
     <p:extLst>
       <p:ext uri="{BB962C8B-B14F-4D97-AF65-F5344CB8AC3E}">
@@ -7855,15 +7976,7 @@
           <a:p>
             <a:r>
               <a:rPr lang="en-IN" dirty="0"/>
-              <a:t>Apache Spark </a:t>
-            </a:r>
-            <a:r>
-              <a:rPr lang="en-IN" dirty="0" err="1"/>
-              <a:t>DataFrame</a:t>
-            </a:r>
-            <a:r>
-              <a:rPr lang="en-IN" dirty="0"/>
-              <a:t> Performance</a:t>
+              <a:t>Apache Spark DataFrame Performance</a:t>
             </a:r>
           </a:p>
         </p:txBody>
@@ -7885,21 +7998,44 @@
           </p:nvPr>
         </p:nvPicPr>
         <p:blipFill>
-          <a:blip r:embed="rId2">
+          <a:blip r:embed="rId2"/>
+          <a:srcRect/>
+          <a:stretch/>
+        </p:blipFill>
+        <p:spPr>
+          <a:xfrm>
+            <a:off x="488268" y="1063625"/>
+            <a:ext cx="8148413" cy="3565525"/>
+          </a:xfrm>
+          <a:prstGeom prst="rect">
+            <a:avLst/>
+          </a:prstGeom>
+        </p:spPr>
+      </p:pic>
+      <p:pic>
+        <p:nvPicPr>
+          <p:cNvPr id="5" name="Picture 4">
             <a:extLst>
-              <a:ext uri="{28A0092B-C50C-407E-A947-70E740481C1C}">
-                <a14:useLocalDpi xmlns:a14="http://schemas.microsoft.com/office/drawing/2010/main" val="0"/>
+              <a:ext uri="{FF2B5EF4-FFF2-40B4-BE49-F238E27FC236}">
+                <a16:creationId xmlns:a16="http://schemas.microsoft.com/office/drawing/2014/main" id="{1282A63C-681C-4C64-839A-223CC343E258}"/>
               </a:ext>
             </a:extLst>
-          </a:blip>
+          </p:cNvPr>
+          <p:cNvPicPr>
+            <a:picLocks noChangeAspect="1"/>
+          </p:cNvPicPr>
+          <p:nvPr/>
+        </p:nvPicPr>
+        <p:blipFill>
+          <a:blip r:embed="rId3"/>
           <a:stretch>
             <a:fillRect/>
           </a:stretch>
         </p:blipFill>
         <p:spPr>
           <a:xfrm>
-            <a:off x="482829" y="1063625"/>
-            <a:ext cx="8159292" cy="3565525"/>
+            <a:off x="304800" y="4603430"/>
+            <a:ext cx="3194581" cy="213378"/>
           </a:xfrm>
           <a:prstGeom prst="rect">
             <a:avLst/>
@@ -7971,7 +8107,7 @@
           <a:p>
             <a:r>
               <a:rPr lang="en-US" dirty="0"/>
-              <a:t>Zoo : </a:t>
+              <a:t>Analytics Zoo : </a:t>
             </a:r>
             <a:r>
               <a:rPr lang="en-US" dirty="0" err="1"/>
@@ -7979,7 +8115,7 @@
             </a:r>
             <a:r>
               <a:rPr lang="en-US" dirty="0"/>
-              <a:t>* Style APIs</a:t>
+              <a:t> Style APIs</a:t>
             </a:r>
             <a:endParaRPr lang="en-IN" dirty="0"/>
           </a:p>
@@ -8331,25 +8467,7 @@
                 </a:solidFill>
                 <a:latin typeface="Andale Mono" panose="020B0509000000000004" pitchFamily="49" charset="0"/>
               </a:rPr>
-              <a:t>## 6.11 - Zoo : </a:t>
-            </a:r>
-            <a:r>
-              <a:rPr lang="en-US" sz="1600" i="1" dirty="0" err="1">
-                <a:solidFill>
-                  <a:srgbClr val="6F7783"/>
-                </a:solidFill>
-                <a:latin typeface="Andale Mono" panose="020B0509000000000004" pitchFamily="49" charset="0"/>
-              </a:rPr>
-              <a:t>Keras</a:t>
-            </a:r>
-            <a:r>
-              <a:rPr lang="en-US" sz="1600" i="1" dirty="0">
-                <a:solidFill>
-                  <a:srgbClr val="6F7783"/>
-                </a:solidFill>
-                <a:latin typeface="Andale Mono" panose="020B0509000000000004" pitchFamily="49" charset="0"/>
-              </a:rPr>
-              <a:t> Style APIs</a:t>
+              <a:t>## 6.11 - Zoo : Keras Style APIs</a:t>
             </a:r>
             <a:r>
               <a:rPr lang="en-US" sz="1600" dirty="0">
@@ -9337,42 +9455,31 @@
             <p:ph sz="quarter" idx="13"/>
           </p:nvPr>
         </p:nvSpPr>
-        <p:spPr/>
+        <p:spPr>
+          <a:xfrm>
+            <a:off x="304800" y="1063187"/>
+            <a:ext cx="8589818" cy="3565964"/>
+          </a:xfrm>
+        </p:spPr>
         <p:txBody>
           <a:bodyPr/>
           <a:lstStyle/>
           <a:p>
             <a:r>
               <a:rPr lang="en-US" dirty="0"/>
-              <a:t>Easy-to-use </a:t>
-            </a:r>
-            <a:r>
-              <a:rPr lang="en-US" dirty="0" err="1"/>
-              <a:t>DataFrame</a:t>
-            </a:r>
+              <a:t>Easy-to-use DataFrame (DataSet)-based API for training, prediction and evaluation. </a:t>
+            </a:r>
+          </a:p>
+          <a:p>
             <a:r>
               <a:rPr lang="en-US" dirty="0"/>
-              <a:t> (</a:t>
-            </a:r>
-            <a:r>
-              <a:rPr lang="en-US" dirty="0" err="1"/>
-              <a:t>DataSet</a:t>
-            </a:r>
+              <a:t>Integration with Apache Spark ML pipeline and compatibility. </a:t>
+            </a:r>
+          </a:p>
+          <a:p>
             <a:r>
               <a:rPr lang="en-US" dirty="0"/>
-              <a:t>)-based API for training, prediction and evaluation </a:t>
-            </a:r>
-          </a:p>
-          <a:p>
-            <a:r>
-              <a:rPr lang="en-US" dirty="0"/>
-              <a:t>Integration with Apache Spark* ML pipeline and compatibility </a:t>
-            </a:r>
-          </a:p>
-          <a:p>
-            <a:r>
-              <a:rPr lang="en-US" dirty="0"/>
-              <a:t>Can use feature transformers and algorithms in Spark* ML.</a:t>
+              <a:t>Can use feature transformers and algorithms in Spark ML.</a:t>
             </a:r>
           </a:p>
           <a:p>
@@ -9386,35 +9493,19 @@
             </a:r>
             <a:r>
               <a:rPr lang="en-US" dirty="0"/>
-              <a:t>*, </a:t>
-            </a:r>
-            <a:r>
-              <a:rPr lang="en-US" dirty="0" err="1"/>
-              <a:t>Tensorflow</a:t>
-            </a:r>
+              <a:t>, TensorFlow, or BigDL.</a:t>
+            </a:r>
+          </a:p>
+          <a:p>
             <a:r>
               <a:rPr lang="en-US" dirty="0"/>
-              <a:t>* or BigDL.</a:t>
+              <a:t>Training of BigDL built-in neural models (e.g., Inception, ResNet, Wide And Deep).</a:t>
             </a:r>
           </a:p>
           <a:p>
             <a:r>
               <a:rPr lang="en-US" dirty="0"/>
-              <a:t>Training of BigDL built-in neural models (e.g., Inception, </a:t>
-            </a:r>
-            <a:r>
-              <a:rPr lang="en-US" dirty="0" err="1"/>
-              <a:t>ResNet</a:t>
-            </a:r>
-            <a:r>
-              <a:rPr lang="en-US" dirty="0"/>
-              <a:t>, Wide And Deep).</a:t>
-            </a:r>
-          </a:p>
-          <a:p>
-            <a:r>
-              <a:rPr lang="en-US" dirty="0"/>
-              <a:t>Rich toolset for feature extraction and processing, including image, audio and texts</a:t>
+              <a:t>Rich toolset for feature extraction and processing, including image, audio, and texts.</a:t>
             </a:r>
             <a:endParaRPr lang="en-IN" dirty="0"/>
           </a:p>
@@ -9442,12 +9533,8 @@
           <a:lstStyle/>
           <a:p>
             <a:r>
-              <a:rPr lang="en-US" dirty="0" err="1"/>
-              <a:t>NNFrames</a:t>
-            </a:r>
-            <a:r>
               <a:rPr lang="en-US" dirty="0"/>
-              <a:t> Highlights</a:t>
+              <a:t>NNFrames Highlights</a:t>
             </a:r>
             <a:endParaRPr lang="en-IN" dirty="0"/>
           </a:p>
@@ -9547,12 +9634,8 @@
           <a:lstStyle/>
           <a:p>
             <a:r>
-              <a:rPr lang="en-US" dirty="0" err="1"/>
-              <a:t>NNFrames</a:t>
-            </a:r>
-            <a:r>
               <a:rPr lang="en-US" dirty="0"/>
-              <a:t> Useful Classes</a:t>
+              <a:t>NNFrames Useful Classes</a:t>
             </a:r>
             <a:endParaRPr lang="en-IN" dirty="0"/>
           </a:p>
@@ -9906,7 +9989,7 @@
             <p:ph sz="quarter" idx="13"/>
             <p:extLst>
               <p:ext uri="{D42A27DB-BD31-4B8C-83A1-F6EECF244321}">
-                <p14:modId xmlns:p14="http://schemas.microsoft.com/office/powerpoint/2010/main" val="2548941703"/>
+                <p14:modId xmlns:p14="http://schemas.microsoft.com/office/powerpoint/2010/main" val="1127367468"/>
               </p:ext>
             </p:extLst>
           </p:nvPr>
@@ -9979,10 +10062,9 @@
                     <a:p>
                       <a:pPr algn="l"/>
                       <a:r>
-                        <a:rPr lang="en-US" sz="1600" dirty="0" err="1"/>
+                        <a:rPr lang="en-US" sz="1600" dirty="0"/>
                         <a:t>NNEstimator</a:t>
                       </a:r>
-                      <a:endParaRPr lang="en-US" sz="1600" dirty="0"/>
                     </a:p>
                   </a:txBody>
                   <a:tcPr/>
@@ -9995,15 +10077,7 @@
                       <a:pPr algn="l"/>
                       <a:r>
                         <a:rPr lang="en-US" sz="1600" dirty="0"/>
-                        <a:t>Extends </a:t>
-                      </a:r>
-                      <a:r>
-                        <a:rPr lang="en-US" sz="1600" dirty="0" err="1"/>
-                        <a:t>org.apache.spark.ml.Estimator</a:t>
-                      </a:r>
-                      <a:r>
-                        <a:rPr lang="en-US" sz="1600" dirty="0"/>
-                        <a:t> </a:t>
+                        <a:t>Extends org.apache.spark.ml.Estimator </a:t>
                       </a:r>
                     </a:p>
                   </a:txBody>
@@ -10023,10 +10097,9 @@
                     <a:p>
                       <a:pPr algn="l"/>
                       <a:r>
-                        <a:rPr lang="en-US" sz="1600" dirty="0" err="1"/>
+                        <a:rPr lang="en-US" sz="1600" dirty="0"/>
                         <a:t>NNModel</a:t>
                       </a:r>
-                      <a:endParaRPr lang="en-US" sz="1600" dirty="0"/>
                     </a:p>
                   </a:txBody>
                   <a:tcPr/>
@@ -10059,10 +10132,9 @@
                     <a:p>
                       <a:pPr algn="l"/>
                       <a:r>
-                        <a:rPr lang="en-US" sz="1600" dirty="0" err="1"/>
+                        <a:rPr lang="en-US" sz="1600" dirty="0"/>
                         <a:t>NNClassifier</a:t>
                       </a:r>
-                      <a:endParaRPr lang="en-US" sz="1600" dirty="0"/>
                     </a:p>
                   </a:txBody>
                   <a:tcPr/>
@@ -10095,10 +10167,9 @@
                     <a:p>
                       <a:pPr algn="l"/>
                       <a:r>
-                        <a:rPr lang="en-US" sz="1600" dirty="0" err="1"/>
+                        <a:rPr lang="en-US" sz="1600" dirty="0"/>
                         <a:t>NNClassifierModel</a:t>
                       </a:r>
-                      <a:endParaRPr lang="en-US" sz="1600" dirty="0"/>
                     </a:p>
                   </a:txBody>
                   <a:tcPr/>
@@ -10111,15 +10182,7 @@
                       <a:pPr algn="l"/>
                       <a:r>
                         <a:rPr lang="en-US" sz="1600" dirty="0"/>
-                        <a:t>Specialized </a:t>
-                      </a:r>
-                      <a:r>
-                        <a:rPr lang="en-US" sz="1600" dirty="0" err="1"/>
-                        <a:t>NNModel</a:t>
-                      </a:r>
-                      <a:r>
-                        <a:rPr lang="en-US" sz="1600" dirty="0"/>
-                        <a:t> for classification task</a:t>
+                        <a:t>Specialized NNModel for classification task</a:t>
                       </a:r>
                     </a:p>
                   </a:txBody>
@@ -10139,10 +10202,9 @@
                     <a:p>
                       <a:pPr algn="l"/>
                       <a:r>
-                        <a:rPr lang="en-US" sz="1600" dirty="0" err="1"/>
+                        <a:rPr lang="en-US" sz="1600" dirty="0"/>
                         <a:t>NNImageReader</a:t>
                       </a:r>
-                      <a:endParaRPr lang="en-US" sz="1600" dirty="0"/>
                     </a:p>
                   </a:txBody>
                   <a:tcPr/>
@@ -10155,7 +10217,7 @@
                       <a:pPr algn="l"/>
                       <a:r>
                         <a:rPr lang="en-US" sz="1600" dirty="0"/>
-                        <a:t>Reads in Image data</a:t>
+                        <a:t>Reads in image data</a:t>
                       </a:r>
                     </a:p>
                   </a:txBody>
@@ -10229,7 +10291,7 @@
             <p:ph sz="quarter" idx="13"/>
             <p:extLst>
               <p:ext uri="{D42A27DB-BD31-4B8C-83A1-F6EECF244321}">
-                <p14:modId xmlns:p14="http://schemas.microsoft.com/office/powerpoint/2010/main" val="2196046448"/>
+                <p14:modId xmlns:p14="http://schemas.microsoft.com/office/powerpoint/2010/main" val="1050083412"/>
               </p:ext>
             </p:extLst>
           </p:nvPr>
@@ -10301,10 +10363,9 @@
                     <a:p>
                       <a:pPr algn="l"/>
                       <a:r>
-                        <a:rPr lang="en-US" sz="1400" dirty="0" err="1"/>
+                        <a:rPr lang="en-US" sz="1400" dirty="0"/>
                         <a:t>NNImageReader</a:t>
                       </a:r>
-                      <a:endParaRPr lang="en-US" sz="1400" dirty="0"/>
                     </a:p>
                   </a:txBody>
                   <a:tcPr/>
@@ -10317,7 +10378,7 @@
                       <a:pPr algn="l"/>
                       <a:r>
                         <a:rPr lang="en-US" sz="1400" dirty="0"/>
-                        <a:t>Reads images into Apache Spark* DataFrame</a:t>
+                        <a:t>Reads images into Apache Spark DataFrame</a:t>
                       </a:r>
                     </a:p>
                   </a:txBody>
@@ -10381,7 +10442,7 @@
                       <a:pPr algn="l"/>
                       <a:r>
                         <a:rPr lang="en-US" sz="1400" dirty="0"/>
-                        <a:t>Zoo provides many pre-defined image processing transformers built on top of OpenCV™</a:t>
+                        <a:t>Analytics Zoo provides many pre-defined image processing transformers built on top of OpenCV</a:t>
                       </a:r>
                     </a:p>
                   </a:txBody>
@@ -10411,12 +10472,8 @@
                     <a:p>
                       <a:pPr algn="l"/>
                       <a:r>
-                        <a:rPr lang="en-US" sz="1400" dirty="0" err="1"/>
-                        <a:t>ImageBrightness</a:t>
-                      </a:r>
-                      <a:r>
                         <a:rPr lang="en-US" sz="1400" dirty="0"/>
-                        <a:t> – adjusts Image brightness</a:t>
+                        <a:t>ImageBrightness – adjust image brightness</a:t>
                       </a:r>
                     </a:p>
                   </a:txBody>
@@ -10446,12 +10503,8 @@
                     <a:p>
                       <a:pPr algn="l"/>
                       <a:r>
-                        <a:rPr lang="en-US" sz="1400" dirty="0" err="1"/>
-                        <a:t>ImageResize</a:t>
-                      </a:r>
-                      <a:r>
                         <a:rPr lang="en-US" sz="1400" dirty="0"/>
-                        <a:t> – resize image</a:t>
+                        <a:t>ImageResize – resize image</a:t>
                       </a:r>
                     </a:p>
                   </a:txBody>
@@ -10481,20 +10534,8 @@
                     <a:p>
                       <a:pPr algn="l"/>
                       <a:r>
-                        <a:rPr lang="en-US" sz="1400" dirty="0" err="1"/>
-                        <a:t>ImageMatToTensor</a:t>
-                      </a:r>
-                      <a:r>
                         <a:rPr lang="en-US" sz="1400" dirty="0"/>
-                        <a:t> - Transform </a:t>
-                      </a:r>
-                      <a:r>
-                        <a:rPr lang="en-US" sz="1400" dirty="0" err="1"/>
-                        <a:t>opencv</a:t>
-                      </a:r>
-                      <a:r>
-                        <a:rPr lang="en-US" sz="1400" dirty="0"/>
-                        <a:t> mat to tensor</a:t>
+                        <a:t>ImageMatToTensor - transform OpenCV mat to tensor</a:t>
                       </a:r>
                     </a:p>
                   </a:txBody>
@@ -10545,9 +10586,9 @@
                       </a:r>
                       <a:r>
                         <a:rPr lang="en-US" sz="1400" dirty="0">
-                          <a:hlinkClick r:id="rId2"/>
+                          <a:hlinkClick r:id="rId3"/>
                         </a:rPr>
-                        <a:t>for full list see here</a:t>
+                        <a:t>For full list see here</a:t>
                       </a:r>
                       <a:endParaRPr lang="en-US" sz="1400" dirty="0"/>
                     </a:p>
@@ -10586,12 +10627,8 @@
           <a:lstStyle/>
           <a:p>
             <a:r>
-              <a:rPr lang="en-US" dirty="0" err="1"/>
-              <a:t>zoo.feature.image</a:t>
-            </a:r>
-            <a:r>
               <a:rPr lang="en-US" dirty="0"/>
-              <a:t> Package : Feature Engineering of Images</a:t>
+              <a:t>zoo.feature.image Package : Feature Engineering of Images</a:t>
             </a:r>
             <a:endParaRPr lang="en-IN" dirty="0"/>
           </a:p>
@@ -10612,7 +10649,7 @@
           <p:nvPr/>
         </p:nvPicPr>
         <p:blipFill>
-          <a:blip r:embed="rId3"/>
+          <a:blip r:embed="rId4"/>
           <a:stretch>
             <a:fillRect/>
           </a:stretch>
@@ -10692,34 +10729,14 @@
           <a:p>
             <a:r>
               <a:rPr lang="en-US" dirty="0"/>
-              <a:t>Load images into </a:t>
-            </a:r>
-            <a:r>
-              <a:rPr lang="en-US" dirty="0" err="1"/>
-              <a:t>DataFrames</a:t>
-            </a:r>
-            <a:r>
-              <a:rPr lang="en-US" dirty="0"/>
-              <a:t> using </a:t>
-            </a:r>
-            <a:r>
-              <a:rPr lang="en-US" dirty="0" err="1"/>
-              <a:t>NNImageReader</a:t>
+              <a:t>Load images into DataFrames using NNImageReader</a:t>
             </a:r>
             <a:br>
               <a:rPr lang="en-US" dirty="0"/>
             </a:br>
             <a:r>
               <a:rPr lang="en-US" dirty="0"/>
-              <a:t>Process loaded data using </a:t>
-            </a:r>
-            <a:r>
-              <a:rPr lang="en-US" dirty="0" err="1"/>
-              <a:t>DataFrame</a:t>
-            </a:r>
-            <a:r>
-              <a:rPr lang="en-US" dirty="0"/>
-              <a:t> transformations</a:t>
+              <a:t>Process loaded data using DataFrame transformations</a:t>
             </a:r>
           </a:p>
           <a:p>
@@ -10749,16 +10766,8 @@
           <a:lstStyle/>
           <a:p>
             <a:r>
-              <a:rPr lang="en-US" dirty="0" err="1"/>
-              <a:t>NNFrames</a:t>
-            </a:r>
-            <a:r>
               <a:rPr lang="en-US" dirty="0"/>
-              <a:t>: </a:t>
-            </a:r>
-            <a:r>
-              <a:rPr lang="en-US" dirty="0" err="1"/>
-              <a:t>NNImageReader</a:t>
+              <a:t>NNFrames: NNImageReader</a:t>
             </a:r>
             <a:endParaRPr lang="en-IN" dirty="0"/>
           </a:p>
@@ -11110,10 +11119,10 @@
                 <a:ea typeface="Intel Clear"/>
                 <a:cs typeface="Intel Clear"/>
               </a:rPr>
-              <a:t>## 6.9 - </a:t>
-            </a:r>
-            <a:r>
-              <a:rPr lang="en-US" sz="1600" i="1" kern="0" dirty="0" err="1">
+              <a:t>## 6.9 - NNImageReader</a:t>
+            </a:r>
+            <a:r>
+              <a:rPr lang="en-US" sz="1600" kern="0" dirty="0">
                 <a:solidFill>
                   <a:srgbClr val="6F7783"/>
                 </a:solidFill>
@@ -11121,9 +11130,9 @@
                 <a:ea typeface="Intel Clear"/>
                 <a:cs typeface="Intel Clear"/>
               </a:rPr>
-              <a:t>NNImageReader</a:t>
-            </a:r>
-            <a:r>
+              <a:t> </a:t>
+            </a:r>
+            <a:br>
               <a:rPr lang="en-US" sz="1600" kern="0" dirty="0">
                 <a:solidFill>
                   <a:srgbClr val="6F7783"/>
@@ -11132,12 +11141,143 @@
                 <a:ea typeface="Intel Clear"/>
                 <a:cs typeface="Intel Clear"/>
               </a:rPr>
+            </a:br>
+            <a:r>
+              <a:rPr lang="en-US" sz="1600" kern="0" dirty="0">
+                <a:solidFill>
+                  <a:srgbClr val="D291E4"/>
+                </a:solidFill>
+                <a:latin typeface="Andale Mono" panose="020B0509000000000004" pitchFamily="49" charset="0"/>
+                <a:ea typeface="Intel Clear"/>
+                <a:cs typeface="Intel Clear"/>
+              </a:rPr>
+              <a:t>from</a:t>
+            </a:r>
+            <a:r>
+              <a:rPr lang="en-US" sz="1600" kern="0" dirty="0">
+                <a:solidFill>
+                  <a:srgbClr val="B9C0CB"/>
+                </a:solidFill>
+                <a:latin typeface="Andale Mono" panose="020B0509000000000004" pitchFamily="49" charset="0"/>
+                <a:ea typeface="Intel Clear"/>
+                <a:cs typeface="Intel Clear"/>
+              </a:rPr>
+              <a:t> </a:t>
+            </a:r>
+            <a:r>
+              <a:rPr lang="en-US" sz="1600" kern="0" dirty="0" err="1">
+                <a:solidFill>
+                  <a:srgbClr val="E88388"/>
+                </a:solidFill>
+                <a:latin typeface="Andale Mono" panose="020B0509000000000004" pitchFamily="49" charset="0"/>
+                <a:ea typeface="Intel Clear"/>
+                <a:cs typeface="Intel Clear"/>
+              </a:rPr>
+              <a:t>zoo</a:t>
+            </a:r>
+            <a:r>
+              <a:rPr lang="en-US" sz="1600" kern="0" dirty="0" err="1">
+                <a:solidFill>
+                  <a:srgbClr val="B9C0CB"/>
+                </a:solidFill>
+                <a:latin typeface="Andale Mono" panose="020B0509000000000004" pitchFamily="49" charset="0"/>
+                <a:ea typeface="Intel Clear"/>
+                <a:cs typeface="Intel Clear"/>
+              </a:rPr>
+              <a:t>.</a:t>
+            </a:r>
+            <a:r>
+              <a:rPr lang="en-US" sz="1600" kern="0" dirty="0" err="1">
+                <a:solidFill>
+                  <a:srgbClr val="E88388"/>
+                </a:solidFill>
+                <a:latin typeface="Andale Mono" panose="020B0509000000000004" pitchFamily="49" charset="0"/>
+                <a:ea typeface="Intel Clear"/>
+                <a:cs typeface="Intel Clear"/>
+              </a:rPr>
+              <a:t>common</a:t>
+            </a:r>
+            <a:r>
+              <a:rPr lang="en-US" sz="1600" kern="0" dirty="0" err="1">
+                <a:solidFill>
+                  <a:srgbClr val="B9C0CB"/>
+                </a:solidFill>
+                <a:latin typeface="Andale Mono" panose="020B0509000000000004" pitchFamily="49" charset="0"/>
+                <a:ea typeface="Intel Clear"/>
+                <a:cs typeface="Intel Clear"/>
+              </a:rPr>
+              <a:t>.</a:t>
+            </a:r>
+            <a:r>
+              <a:rPr lang="en-US" sz="1600" kern="0" dirty="0" err="1">
+                <a:solidFill>
+                  <a:srgbClr val="E88388"/>
+                </a:solidFill>
+                <a:latin typeface="Andale Mono" panose="020B0509000000000004" pitchFamily="49" charset="0"/>
+                <a:ea typeface="Intel Clear"/>
+                <a:cs typeface="Intel Clear"/>
+              </a:rPr>
+              <a:t>nncontext</a:t>
+            </a:r>
+            <a:r>
+              <a:rPr lang="en-US" sz="1600" kern="0" dirty="0">
+                <a:solidFill>
+                  <a:srgbClr val="B9C0CB"/>
+                </a:solidFill>
+                <a:latin typeface="Andale Mono" panose="020B0509000000000004" pitchFamily="49" charset="0"/>
+                <a:ea typeface="Intel Clear"/>
+                <a:cs typeface="Intel Clear"/>
+              </a:rPr>
+              <a:t> </a:t>
+            </a:r>
+            <a:r>
+              <a:rPr lang="en-US" sz="1600" kern="0" dirty="0">
+                <a:solidFill>
+                  <a:srgbClr val="D291E4"/>
+                </a:solidFill>
+                <a:latin typeface="Andale Mono" panose="020B0509000000000004" pitchFamily="49" charset="0"/>
+                <a:ea typeface="Intel Clear"/>
+                <a:cs typeface="Intel Clear"/>
+              </a:rPr>
+              <a:t>import</a:t>
+            </a:r>
+            <a:r>
+              <a:rPr lang="en-US" sz="1600" kern="0" dirty="0">
+                <a:solidFill>
+                  <a:srgbClr val="B9C0CB"/>
+                </a:solidFill>
+                <a:latin typeface="Andale Mono" panose="020B0509000000000004" pitchFamily="49" charset="0"/>
+                <a:ea typeface="Intel Clear"/>
+                <a:cs typeface="Intel Clear"/>
+              </a:rPr>
+              <a:t> </a:t>
+            </a:r>
+            <a:r>
+              <a:rPr lang="en-US" sz="1600" kern="0" dirty="0" err="1">
+                <a:solidFill>
+                  <a:srgbClr val="B9C0CB"/>
+                </a:solidFill>
+                <a:latin typeface="Andale Mono" panose="020B0509000000000004" pitchFamily="49" charset="0"/>
+                <a:ea typeface="Intel Clear"/>
+                <a:cs typeface="Intel Clear"/>
+              </a:rPr>
+              <a:t>init_nncontext</a:t>
+            </a:r>
+            <a:r>
+              <a:rPr lang="en-US" sz="1600" kern="0" dirty="0">
+                <a:solidFill>
+                  <a:srgbClr val="B9C0CB"/>
+                </a:solidFill>
+                <a:latin typeface="Andale Mono" panose="020B0509000000000004" pitchFamily="49" charset="0"/>
+                <a:ea typeface="Intel Clear"/>
+                <a:cs typeface="Intel Clear"/>
+              </a:rPr>
               <a:t> </a:t>
             </a:r>
             <a:br>
               <a:rPr lang="en-US" sz="1600" kern="0" dirty="0">
                 <a:solidFill>
-                  <a:srgbClr val="6F7783"/>
+                  <a:srgbClr val="B9C0CB"/>
                 </a:solidFill>
                 <a:latin typeface="Andale Mono" panose="020B0509000000000004" pitchFamily="49" charset="0"/>
                 <a:ea typeface="Intel Clear"/>
@@ -11197,7 +11337,7 @@
                 <a:ea typeface="Intel Clear"/>
                 <a:cs typeface="Intel Clear"/>
               </a:rPr>
-              <a:t>common</a:t>
+              <a:t>pipeline</a:t>
             </a:r>
             <a:r>
               <a:rPr lang="en-US" sz="1600" kern="0" dirty="0" err="1">
@@ -11219,7 +11359,7 @@
                 <a:ea typeface="Intel Clear"/>
                 <a:cs typeface="Intel Clear"/>
               </a:rPr>
-              <a:t>nncontext</a:t>
+              <a:t>nnframes</a:t>
             </a:r>
             <a:r>
               <a:rPr lang="en-US" sz="1600" kern="0" dirty="0">
@@ -11252,171 +11392,7 @@
                 <a:ea typeface="Intel Clear"/>
                 <a:cs typeface="Intel Clear"/>
               </a:rPr>
-              <a:t> </a:t>
-            </a:r>
-            <a:r>
-              <a:rPr lang="en-US" sz="1600" kern="0" dirty="0" err="1">
-                <a:solidFill>
-                  <a:srgbClr val="B9C0CB"/>
-                </a:solidFill>
-                <a:latin typeface="Andale Mono" panose="020B0509000000000004" pitchFamily="49" charset="0"/>
-                <a:ea typeface="Intel Clear"/>
-                <a:cs typeface="Intel Clear"/>
-              </a:rPr>
-              <a:t>init_nncontext</a:t>
-            </a:r>
-            <a:r>
-              <a:rPr lang="en-US" sz="1600" kern="0" dirty="0">
-                <a:solidFill>
-                  <a:srgbClr val="B9C0CB"/>
-                </a:solidFill>
-                <a:latin typeface="Andale Mono" panose="020B0509000000000004" pitchFamily="49" charset="0"/>
-                <a:ea typeface="Intel Clear"/>
-                <a:cs typeface="Intel Clear"/>
-              </a:rPr>
-              <a:t> </a:t>
-            </a:r>
-            <a:br>
-              <a:rPr lang="en-US" sz="1600" kern="0" dirty="0">
-                <a:solidFill>
-                  <a:srgbClr val="B9C0CB"/>
-                </a:solidFill>
-                <a:latin typeface="Andale Mono" panose="020B0509000000000004" pitchFamily="49" charset="0"/>
-                <a:ea typeface="Intel Clear"/>
-                <a:cs typeface="Intel Clear"/>
-              </a:rPr>
-            </a:br>
-            <a:r>
-              <a:rPr lang="en-US" sz="1600" kern="0" dirty="0">
-                <a:solidFill>
-                  <a:srgbClr val="D291E4"/>
-                </a:solidFill>
-                <a:latin typeface="Andale Mono" panose="020B0509000000000004" pitchFamily="49" charset="0"/>
-                <a:ea typeface="Intel Clear"/>
-                <a:cs typeface="Intel Clear"/>
-              </a:rPr>
-              <a:t>from</a:t>
-            </a:r>
-            <a:r>
-              <a:rPr lang="en-US" sz="1600" kern="0" dirty="0">
-                <a:solidFill>
-                  <a:srgbClr val="B9C0CB"/>
-                </a:solidFill>
-                <a:latin typeface="Andale Mono" panose="020B0509000000000004" pitchFamily="49" charset="0"/>
-                <a:ea typeface="Intel Clear"/>
-                <a:cs typeface="Intel Clear"/>
-              </a:rPr>
-              <a:t> </a:t>
-            </a:r>
-            <a:r>
-              <a:rPr lang="en-US" sz="1600" kern="0" dirty="0" err="1">
-                <a:solidFill>
-                  <a:srgbClr val="E88388"/>
-                </a:solidFill>
-                <a:latin typeface="Andale Mono" panose="020B0509000000000004" pitchFamily="49" charset="0"/>
-                <a:ea typeface="Intel Clear"/>
-                <a:cs typeface="Intel Clear"/>
-              </a:rPr>
-              <a:t>zoo</a:t>
-            </a:r>
-            <a:r>
-              <a:rPr lang="en-US" sz="1600" kern="0" dirty="0" err="1">
-                <a:solidFill>
-                  <a:srgbClr val="B9C0CB"/>
-                </a:solidFill>
-                <a:latin typeface="Andale Mono" panose="020B0509000000000004" pitchFamily="49" charset="0"/>
-                <a:ea typeface="Intel Clear"/>
-                <a:cs typeface="Intel Clear"/>
-              </a:rPr>
-              <a:t>.</a:t>
-            </a:r>
-            <a:r>
-              <a:rPr lang="en-US" sz="1600" kern="0" dirty="0" err="1">
-                <a:solidFill>
-                  <a:srgbClr val="E88388"/>
-                </a:solidFill>
-                <a:latin typeface="Andale Mono" panose="020B0509000000000004" pitchFamily="49" charset="0"/>
-                <a:ea typeface="Intel Clear"/>
-                <a:cs typeface="Intel Clear"/>
-              </a:rPr>
-              <a:t>pipeline</a:t>
-            </a:r>
-            <a:r>
-              <a:rPr lang="en-US" sz="1600" kern="0" dirty="0" err="1">
-                <a:solidFill>
-                  <a:srgbClr val="B9C0CB"/>
-                </a:solidFill>
-                <a:latin typeface="Andale Mono" panose="020B0509000000000004" pitchFamily="49" charset="0"/>
-                <a:ea typeface="Intel Clear"/>
-                <a:cs typeface="Intel Clear"/>
-              </a:rPr>
-              <a:t>.</a:t>
-            </a:r>
-            <a:r>
-              <a:rPr lang="en-US" sz="1600" kern="0" dirty="0" err="1">
-                <a:solidFill>
-                  <a:srgbClr val="E88388"/>
-                </a:solidFill>
-                <a:latin typeface="Andale Mono" panose="020B0509000000000004" pitchFamily="49" charset="0"/>
-                <a:ea typeface="Intel Clear"/>
-                <a:cs typeface="Intel Clear"/>
-              </a:rPr>
-              <a:t>nnframes</a:t>
-            </a:r>
-            <a:r>
-              <a:rPr lang="en-US" sz="1600" kern="0" dirty="0">
-                <a:solidFill>
-                  <a:srgbClr val="B9C0CB"/>
-                </a:solidFill>
-                <a:latin typeface="Andale Mono" panose="020B0509000000000004" pitchFamily="49" charset="0"/>
-                <a:ea typeface="Intel Clear"/>
-                <a:cs typeface="Intel Clear"/>
-              </a:rPr>
-              <a:t> </a:t>
-            </a:r>
-            <a:r>
-              <a:rPr lang="en-US" sz="1600" kern="0" dirty="0">
-                <a:solidFill>
-                  <a:srgbClr val="D291E4"/>
-                </a:solidFill>
-                <a:latin typeface="Andale Mono" panose="020B0509000000000004" pitchFamily="49" charset="0"/>
-                <a:ea typeface="Intel Clear"/>
-                <a:cs typeface="Intel Clear"/>
-              </a:rPr>
-              <a:t>import</a:t>
-            </a:r>
-            <a:r>
-              <a:rPr lang="en-US" sz="1600" kern="0" dirty="0">
-                <a:solidFill>
-                  <a:srgbClr val="B9C0CB"/>
-                </a:solidFill>
-                <a:latin typeface="Andale Mono" panose="020B0509000000000004" pitchFamily="49" charset="0"/>
-                <a:ea typeface="Intel Clear"/>
-                <a:cs typeface="Intel Clear"/>
-              </a:rPr>
-              <a:t> </a:t>
-            </a:r>
-            <a:r>
-              <a:rPr lang="en-US" sz="1600" kern="0" dirty="0" err="1">
-                <a:solidFill>
-                  <a:srgbClr val="B9C0CB"/>
-                </a:solidFill>
-                <a:latin typeface="Andale Mono" panose="020B0509000000000004" pitchFamily="49" charset="0"/>
-                <a:ea typeface="Intel Clear"/>
-                <a:cs typeface="Intel Clear"/>
-              </a:rPr>
-              <a:t>NNImageReader</a:t>
-            </a:r>
-            <a:r>
-              <a:rPr lang="en-US" sz="1600" kern="0" dirty="0">
-                <a:solidFill>
-                  <a:srgbClr val="B9C0CB"/>
-                </a:solidFill>
-                <a:latin typeface="Andale Mono" panose="020B0509000000000004" pitchFamily="49" charset="0"/>
-                <a:ea typeface="Intel Clear"/>
-                <a:cs typeface="Intel Clear"/>
-              </a:rPr>
-              <a:t> </a:t>
+              <a:t> NNImageReader </a:t>
             </a:r>
             <a:br>
               <a:rPr lang="en-US" sz="1600" kern="0" dirty="0">
@@ -12038,7 +12014,7 @@
           <a:p>
             <a:r>
               <a:rPr lang="en-US" dirty="0"/>
-              <a:t>Process Images using built-in feature engineering operations</a:t>
+              <a:t>Process images using built-in feature engineering operations</a:t>
             </a:r>
           </a:p>
           <a:p>
@@ -12530,25 +12506,7 @@
                 </a:solidFill>
                 <a:latin typeface="Andale Mono" panose="020B0509000000000004" pitchFamily="49" charset="0"/>
               </a:rPr>
-              <a:t> </a:t>
-            </a:r>
-            <a:r>
-              <a:rPr lang="en-US" sz="1400" dirty="0" err="1">
-                <a:solidFill>
-                  <a:srgbClr val="B9C0CB"/>
-                </a:solidFill>
-                <a:latin typeface="Andale Mono" panose="020B0509000000000004" pitchFamily="49" charset="0"/>
-              </a:rPr>
-              <a:t>NNImageReader</a:t>
-            </a:r>
-            <a:r>
-              <a:rPr lang="en-US" sz="1400" dirty="0">
-                <a:solidFill>
-                  <a:srgbClr val="B9C0CB"/>
-                </a:solidFill>
-                <a:latin typeface="Andale Mono" panose="020B0509000000000004" pitchFamily="49" charset="0"/>
-              </a:rPr>
-              <a:t>, </a:t>
+              <a:t> NNImageReader, </a:t>
             </a:r>
             <a:r>
               <a:rPr lang="en-US" sz="1400" dirty="0" err="1">
@@ -12595,7 +12553,7 @@
               <a:t> </a:t>
             </a:r>
             <a:r>
-              <a:rPr lang="en-US" sz="1400" dirty="0" err="1">
+              <a:rPr lang="en-US" sz="1400" dirty="0">
                 <a:solidFill>
                   <a:srgbClr val="E88388"/>
                 </a:solidFill>
@@ -12604,7 +12562,7 @@
               <a:t>zoo</a:t>
             </a:r>
             <a:r>
-              <a:rPr lang="en-US" sz="1400" dirty="0" err="1">
+              <a:rPr lang="en-US" sz="1400" dirty="0">
                 <a:solidFill>
                   <a:srgbClr val="B9C0CB"/>
                 </a:solidFill>
@@ -12613,7 +12571,7 @@
               <a:t>.</a:t>
             </a:r>
             <a:r>
-              <a:rPr lang="en-US" sz="1400" dirty="0" err="1">
+              <a:rPr lang="en-US" sz="1400" dirty="0">
                 <a:solidFill>
                   <a:srgbClr val="E88388"/>
                 </a:solidFill>
@@ -12622,7 +12580,7 @@
               <a:t>feature</a:t>
             </a:r>
             <a:r>
-              <a:rPr lang="en-US" sz="1400" dirty="0" err="1">
+              <a:rPr lang="en-US" sz="1400" dirty="0">
                 <a:solidFill>
                   <a:srgbClr val="B9C0CB"/>
                 </a:solidFill>
@@ -12631,7 +12589,7 @@
               <a:t>.</a:t>
             </a:r>
             <a:r>
-              <a:rPr lang="en-US" sz="1400" dirty="0" err="1">
+              <a:rPr lang="en-US" sz="1400" dirty="0">
                 <a:solidFill>
                   <a:srgbClr val="E88388"/>
                 </a:solidFill>
@@ -12711,22 +12669,13 @@
               </a:rPr>
             </a:br>
             <a:r>
-              <a:rPr lang="en-US" sz="1400" dirty="0" err="1">
-                <a:solidFill>
-                  <a:srgbClr val="B9C0CB"/>
-                </a:solidFill>
-                <a:latin typeface="Andale Mono" panose="020B0509000000000004" pitchFamily="49" charset="0"/>
-              </a:rPr>
-              <a:t>ImageMatToTensor</a:t>
-            </a:r>
-            <a:r>
               <a:rPr lang="en-US" sz="1400" dirty="0">
                 <a:solidFill>
                   <a:srgbClr val="B9C0CB"/>
                 </a:solidFill>
                 <a:latin typeface="Andale Mono" panose="020B0509000000000004" pitchFamily="49" charset="0"/>
               </a:rPr>
-              <a:t>, </a:t>
+              <a:t>ImageMatToTensor, </a:t>
             </a:r>
             <a:r>
               <a:rPr lang="en-US" sz="1400" dirty="0" err="1">
@@ -12940,7 +12889,7 @@
               <a:t>                </a:t>
             </a:r>
             <a:r>
-              <a:rPr lang="en-US" sz="1400" dirty="0" err="1">
+              <a:rPr lang="en-US" sz="1400" dirty="0">
                 <a:solidFill>
                   <a:srgbClr val="72BEF2"/>
                 </a:solidFill>
@@ -13074,22 +13023,14 @@
           <a:p>
             <a:r>
               <a:rPr lang="en-US" dirty="0"/>
-              <a:t>Train Model Using Spark ML Pipelines</a:t>
+              <a:t>Train model using Apache Spark ML Pipelines</a:t>
             </a:r>
             <a:br>
               <a:rPr lang="en-US" dirty="0"/>
             </a:br>
             <a:r>
               <a:rPr lang="en-US" dirty="0"/>
-              <a:t>Process loaded data using </a:t>
-            </a:r>
-            <a:r>
-              <a:rPr lang="en-US" dirty="0" err="1"/>
-              <a:t>DataFrame</a:t>
-            </a:r>
-            <a:r>
-              <a:rPr lang="en-US" dirty="0"/>
-              <a:t> transformations</a:t>
+              <a:t>Process loaded data using DataFrame transformations</a:t>
             </a:r>
           </a:p>
           <a:p>
@@ -13119,12 +13060,8 @@
           <a:lstStyle/>
           <a:p>
             <a:r>
-              <a:rPr lang="en-US" dirty="0" err="1"/>
-              <a:t>NNFrames</a:t>
-            </a:r>
-            <a:r>
               <a:rPr lang="en-US" dirty="0"/>
-              <a:t>: Native DL Support in Apache Spark* </a:t>
+              <a:t>NNFrames: Native DL Support in Apache Spark </a:t>
             </a:r>
             <a:r>
               <a:rPr lang="en-US" dirty="0" err="1"/>
@@ -13259,7 +13196,7 @@
           <a:p>
             <a:r>
               <a:rPr lang="en-IN" dirty="0"/>
-              <a:t>We will illustrate 3 steps</a:t>
+              <a:t>We illustrate three steps:</a:t>
             </a:r>
           </a:p>
           <a:p>
@@ -13268,7 +13205,7 @@
             </a:pPr>
             <a:r>
               <a:rPr lang="en-IN" dirty="0"/>
-              <a:t>Data wrangling using Spark</a:t>
+              <a:t>Data wrangling using Apache Spark</a:t>
             </a:r>
           </a:p>
           <a:p>
@@ -13328,7 +13265,7 @@
             </a:r>
             <a:r>
               <a:rPr lang="en-US" dirty="0"/>
-              <a:t> on Zoo</a:t>
+              <a:t> on Analytics Zoo</a:t>
             </a:r>
             <a:endParaRPr lang="en-IN" dirty="0"/>
           </a:p>
@@ -13424,7 +13361,7 @@
         </p:nvSpPr>
         <p:spPr>
           <a:xfrm>
-            <a:off x="304800" y="1063187"/>
+            <a:off x="304800" y="910285"/>
             <a:ext cx="8515468" cy="488295"/>
           </a:xfrm>
         </p:spPr>
@@ -13437,7 +13374,7 @@
             </a:pPr>
             <a:r>
               <a:rPr lang="en-IN" dirty="0"/>
-              <a:t>Data wrangling using Spark</a:t>
+              <a:t>Data wrangling using Apache Spark</a:t>
             </a:r>
           </a:p>
           <a:p>
@@ -13471,15 +13408,7 @@
           <a:p>
             <a:r>
               <a:rPr lang="en-US" dirty="0"/>
-              <a:t>Distributed </a:t>
-            </a:r>
-            <a:r>
-              <a:rPr lang="en-US" dirty="0" err="1"/>
-              <a:t>Tensorflow</a:t>
-            </a:r>
-            <a:r>
-              <a:rPr lang="en-US" dirty="0"/>
-              <a:t> on Zoo</a:t>
+              <a:t>Distributed TensorFlow on Analytics Zoo</a:t>
             </a:r>
             <a:endParaRPr lang="en-IN" dirty="0"/>
           </a:p>
@@ -13531,7 +13460,7 @@
         </p:nvSpPr>
         <p:spPr bwMode="auto">
           <a:xfrm>
-            <a:off x="323732" y="1398580"/>
+            <a:off x="304800" y="1199493"/>
             <a:ext cx="8394071" cy="3231654"/>
           </a:xfrm>
           <a:prstGeom prst="rect">
@@ -14430,6 +14359,36 @@
           </a:p>
         </p:txBody>
       </p:sp>
+      <p:pic>
+        <p:nvPicPr>
+          <p:cNvPr id="6" name="Picture 5">
+            <a:extLst>
+              <a:ext uri="{FF2B5EF4-FFF2-40B4-BE49-F238E27FC236}">
+                <a16:creationId xmlns:a16="http://schemas.microsoft.com/office/drawing/2014/main" id="{A5E2D407-2432-4E1D-B288-E8C5FF2F36D9}"/>
+              </a:ext>
+            </a:extLst>
+          </p:cNvPr>
+          <p:cNvPicPr>
+            <a:picLocks noChangeAspect="1"/>
+          </p:cNvPicPr>
+          <p:nvPr/>
+        </p:nvPicPr>
+        <p:blipFill>
+          <a:blip r:embed="rId2"/>
+          <a:stretch>
+            <a:fillRect/>
+          </a:stretch>
+        </p:blipFill>
+        <p:spPr>
+          <a:xfrm>
+            <a:off x="471054" y="4506977"/>
+            <a:ext cx="3194581" cy="213378"/>
+          </a:xfrm>
+          <a:prstGeom prst="rect">
+            <a:avLst/>
+          </a:prstGeom>
+        </p:spPr>
+      </p:pic>
     </p:spTree>
     <p:extLst>
       <p:ext uri="{BB962C8B-B14F-4D97-AF65-F5344CB8AC3E}">
@@ -14503,7 +14462,7 @@
             </a:pPr>
             <a:r>
               <a:rPr lang="en-US" dirty="0"/>
-              <a:t>Quick look at Zoo APIs</a:t>
+              <a:t>Quick look at Analytics Zoo APIs</a:t>
             </a:r>
           </a:p>
           <a:p>
@@ -14642,15 +14601,7 @@
           <a:p>
             <a:r>
               <a:rPr lang="en-US" dirty="0"/>
-              <a:t>Distributed </a:t>
-            </a:r>
-            <a:r>
-              <a:rPr lang="en-US" dirty="0" err="1"/>
-              <a:t>Tensorflow</a:t>
-            </a:r>
-            <a:r>
-              <a:rPr lang="en-US" dirty="0"/>
-              <a:t> on Zoo</a:t>
+              <a:t>Distributed TensorFlow on Analytics Zoo</a:t>
             </a:r>
             <a:endParaRPr lang="en-IN" dirty="0"/>
           </a:p>
@@ -14678,7 +14629,7 @@
         </p:blipFill>
         <p:spPr>
           <a:xfrm>
-            <a:off x="304800" y="4217769"/>
+            <a:off x="304800" y="4508714"/>
             <a:ext cx="3194581" cy="213378"/>
           </a:xfrm>
           <a:prstGeom prst="rect">
@@ -15515,7 +15466,7 @@
           <a:p>
             <a:r>
               <a:rPr lang="en-IN" dirty="0"/>
-              <a:t>3. Distributed training on Spark</a:t>
+              <a:t>3. Distributed training on Apache Spark</a:t>
             </a:r>
           </a:p>
           <a:p>
@@ -15549,15 +15500,7 @@
           <a:p>
             <a:r>
               <a:rPr lang="en-US" dirty="0"/>
-              <a:t>Distributed </a:t>
-            </a:r>
-            <a:r>
-              <a:rPr lang="en-US" dirty="0" err="1"/>
-              <a:t>Tensorflow</a:t>
-            </a:r>
-            <a:r>
-              <a:rPr lang="en-US" dirty="0"/>
-              <a:t> on Zoo</a:t>
+              <a:t>Distributed TensorFlow on Analytics Zoo</a:t>
             </a:r>
             <a:endParaRPr lang="en-IN" dirty="0"/>
           </a:p>
@@ -15585,7 +15528,7 @@
         </p:blipFill>
         <p:spPr>
           <a:xfrm>
-            <a:off x="304800" y="4217769"/>
+            <a:off x="323732" y="4453296"/>
             <a:ext cx="3194581" cy="213378"/>
           </a:xfrm>
           <a:prstGeom prst="rect">
@@ -16388,7 +16331,7 @@
         </p:nvSpPr>
         <p:spPr>
           <a:xfrm>
-            <a:off x="304800" y="1063187"/>
+            <a:off x="304800" y="794396"/>
             <a:ext cx="8515468" cy="1094546"/>
           </a:xfrm>
         </p:spPr>
@@ -16398,7 +16341,15 @@
           <a:p>
             <a:r>
               <a:rPr lang="en-IN" sz="1600" dirty="0"/>
-              <a:t>We are loading a Caffe model</a:t>
+              <a:t>We are loading a </a:t>
+            </a:r>
+            <a:r>
+              <a:rPr lang="en-IN" sz="1600" dirty="0" err="1"/>
+              <a:t>Caffe</a:t>
+            </a:r>
+            <a:r>
+              <a:rPr lang="en-IN" sz="1600" dirty="0"/>
+              <a:t>* model</a:t>
             </a:r>
             <a:br>
               <a:rPr lang="en-IN" sz="1600" dirty="0"/>
@@ -16412,15 +16363,7 @@
             </a:br>
             <a:r>
               <a:rPr lang="en-IN" sz="1600" dirty="0"/>
-              <a:t>Freezing </a:t>
-            </a:r>
-            <a:r>
-              <a:rPr lang="en-IN" sz="1600" dirty="0" err="1"/>
-              <a:t>firest</a:t>
-            </a:r>
-            <a:r>
-              <a:rPr lang="en-IN" sz="1600" dirty="0"/>
-              <a:t> few layers</a:t>
+              <a:t>Freezing first few layers</a:t>
             </a:r>
             <a:br>
               <a:rPr lang="en-IN" sz="1600" dirty="0"/>
@@ -16507,7 +16450,7 @@
         </p:nvSpPr>
         <p:spPr bwMode="auto">
           <a:xfrm>
-            <a:off x="304800" y="2035662"/>
+            <a:off x="304800" y="1888942"/>
             <a:ext cx="8394071" cy="2677656"/>
           </a:xfrm>
           <a:prstGeom prst="rect">
@@ -17186,6 +17129,36 @@
           </a:p>
         </p:txBody>
       </p:sp>
+      <p:pic>
+        <p:nvPicPr>
+          <p:cNvPr id="6" name="Picture 5">
+            <a:extLst>
+              <a:ext uri="{FF2B5EF4-FFF2-40B4-BE49-F238E27FC236}">
+                <a16:creationId xmlns:a16="http://schemas.microsoft.com/office/drawing/2014/main" id="{A5E2D407-2432-4E1D-B288-E8C5FF2F36D9}"/>
+              </a:ext>
+            </a:extLst>
+          </p:cNvPr>
+          <p:cNvPicPr>
+            <a:picLocks noChangeAspect="1"/>
+          </p:cNvPicPr>
+          <p:nvPr/>
+        </p:nvPicPr>
+        <p:blipFill>
+          <a:blip r:embed="rId2"/>
+          <a:stretch>
+            <a:fillRect/>
+          </a:stretch>
+        </p:blipFill>
+        <p:spPr>
+          <a:xfrm>
+            <a:off x="304800" y="4566598"/>
+            <a:ext cx="3194581" cy="192438"/>
+          </a:xfrm>
+          <a:prstGeom prst="rect">
+            <a:avLst/>
+          </a:prstGeom>
+        </p:spPr>
+      </p:pic>
     </p:spTree>
     <p:extLst>
       <p:ext uri="{BB962C8B-B14F-4D97-AF65-F5344CB8AC3E}">
@@ -17251,42 +17224,12 @@
           <a:p>
             <a:r>
               <a:rPr lang="en-US" dirty="0"/>
-              <a:t>Model Serving API – Java</a:t>
+              <a:t>Model Serving API – Java*</a:t>
             </a:r>
             <a:endParaRPr lang="en-IN" dirty="0"/>
           </a:p>
         </p:txBody>
       </p:sp>
-      <p:pic>
-        <p:nvPicPr>
-          <p:cNvPr id="4" name="Picture 3">
-            <a:extLst>
-              <a:ext uri="{FF2B5EF4-FFF2-40B4-BE49-F238E27FC236}">
-                <a16:creationId xmlns:a16="http://schemas.microsoft.com/office/drawing/2014/main" id="{A5E2D407-2432-4E1D-B288-E8C5FF2F36D9}"/>
-              </a:ext>
-            </a:extLst>
-          </p:cNvPr>
-          <p:cNvPicPr>
-            <a:picLocks noChangeAspect="1"/>
-          </p:cNvPicPr>
-          <p:nvPr/>
-        </p:nvPicPr>
-        <p:blipFill>
-          <a:blip r:embed="rId2"/>
-          <a:stretch>
-            <a:fillRect/>
-          </a:stretch>
-        </p:blipFill>
-        <p:spPr>
-          <a:xfrm>
-            <a:off x="304800" y="4217769"/>
-            <a:ext cx="3194581" cy="213378"/>
-          </a:xfrm>
-          <a:prstGeom prst="rect">
-            <a:avLst/>
-          </a:prstGeom>
-        </p:spPr>
-      </p:pic>
       <p:sp>
         <p:nvSpPr>
           <p:cNvPr id="5" name="Text Box 4">
@@ -17303,8 +17246,8 @@
         </p:nvSpPr>
         <p:spPr bwMode="auto">
           <a:xfrm>
-            <a:off x="365498" y="794396"/>
-            <a:ext cx="8394071" cy="3785652"/>
+            <a:off x="436418" y="794396"/>
+            <a:ext cx="8323151" cy="3785652"/>
           </a:xfrm>
           <a:prstGeom prst="rect">
             <a:avLst/>
@@ -18787,6 +18730,36 @@
           </a:p>
         </p:txBody>
       </p:sp>
+      <p:pic>
+        <p:nvPicPr>
+          <p:cNvPr id="6" name="Picture 5">
+            <a:extLst>
+              <a:ext uri="{FF2B5EF4-FFF2-40B4-BE49-F238E27FC236}">
+                <a16:creationId xmlns:a16="http://schemas.microsoft.com/office/drawing/2014/main" id="{A5E2D407-2432-4E1D-B288-E8C5FF2F36D9}"/>
+              </a:ext>
+            </a:extLst>
+          </p:cNvPr>
+          <p:cNvPicPr>
+            <a:picLocks noChangeAspect="1"/>
+          </p:cNvPicPr>
+          <p:nvPr/>
+        </p:nvPicPr>
+        <p:blipFill>
+          <a:blip r:embed="rId2"/>
+          <a:stretch>
+            <a:fillRect/>
+          </a:stretch>
+        </p:blipFill>
+        <p:spPr>
+          <a:xfrm>
+            <a:off x="365498" y="4580048"/>
+            <a:ext cx="3194581" cy="213378"/>
+          </a:xfrm>
+          <a:prstGeom prst="rect">
+            <a:avLst/>
+          </a:prstGeom>
+        </p:spPr>
+      </p:pic>
     </p:spTree>
     <p:extLst>
       <p:ext uri="{BB962C8B-B14F-4D97-AF65-F5344CB8AC3E}">
@@ -18852,7 +18825,7 @@
           <a:p>
             <a:r>
               <a:rPr lang="en-US" dirty="0"/>
-              <a:t>Model Serving API – Open VINO (Python)</a:t>
+              <a:t>Model Serving API – Open VINO* (Python*)</a:t>
             </a:r>
             <a:endParaRPr lang="en-IN" dirty="0"/>
           </a:p>
@@ -18880,7 +18853,7 @@
         </p:blipFill>
         <p:spPr>
           <a:xfrm>
-            <a:off x="304800" y="4217769"/>
+            <a:off x="304800" y="4363242"/>
             <a:ext cx="3194581" cy="213378"/>
           </a:xfrm>
           <a:prstGeom prst="rect">
@@ -19525,25 +19498,7 @@
                 </a:solidFill>
                 <a:latin typeface="Andale Mono" panose="020B0509000000000004" pitchFamily="49" charset="0"/>
               </a:rPr>
-              <a:t>"</a:t>
-            </a:r>
-            <a:r>
-              <a:rPr lang="en-US" sz="1200" dirty="0" err="1">
-                <a:solidFill>
-                  <a:srgbClr val="A7CC8C"/>
-                </a:solidFill>
-                <a:latin typeface="Andale Mono" panose="020B0509000000000004" pitchFamily="49" charset="0"/>
-              </a:rPr>
-              <a:t>OpenVINO</a:t>
-            </a:r>
-            <a:r>
-              <a:rPr lang="en-US" sz="1200" dirty="0">
-                <a:solidFill>
-                  <a:srgbClr val="A7CC8C"/>
-                </a:solidFill>
-                <a:latin typeface="Andale Mono" panose="020B0509000000000004" pitchFamily="49" charset="0"/>
-              </a:rPr>
-              <a:t> Object Detection Inference Example"</a:t>
+              <a:t>"OpenVINO Object Detection Inference Example"</a:t>
             </a:r>
             <a:r>
               <a:rPr lang="en-US" sz="1200" dirty="0">
@@ -20438,11 +20393,41 @@
           <a:p>
             <a:r>
               <a:rPr lang="en-US" dirty="0"/>
-              <a:t>Analytics Zoo Built-in Models</a:t>
+              <a:t>Built-in Models</a:t>
             </a:r>
           </a:p>
         </p:txBody>
       </p:sp>
+      <p:pic>
+        <p:nvPicPr>
+          <p:cNvPr id="3" name="Picture 2">
+            <a:extLst>
+              <a:ext uri="{FF2B5EF4-FFF2-40B4-BE49-F238E27FC236}">
+                <a16:creationId xmlns:a16="http://schemas.microsoft.com/office/drawing/2014/main" id="{C0CF86AF-55BA-D445-8794-B6E21E989C8D}"/>
+              </a:ext>
+            </a:extLst>
+          </p:cNvPr>
+          <p:cNvPicPr>
+            <a:picLocks noChangeAspect="1"/>
+          </p:cNvPicPr>
+          <p:nvPr/>
+        </p:nvPicPr>
+        <p:blipFill>
+          <a:blip r:embed="rId3"/>
+          <a:stretch>
+            <a:fillRect/>
+          </a:stretch>
+        </p:blipFill>
+        <p:spPr>
+          <a:xfrm>
+            <a:off x="3012585" y="145657"/>
+            <a:ext cx="3063289" cy="2106522"/>
+          </a:xfrm>
+          <a:prstGeom prst="rect">
+            <a:avLst/>
+          </a:prstGeom>
+        </p:spPr>
+      </p:pic>
     </p:spTree>
     <p:extLst>
       <p:ext uri="{BB962C8B-B14F-4D97-AF65-F5344CB8AC3E}">
@@ -20501,7 +20486,7 @@
             <p:ph sz="quarter" idx="13"/>
             <p:extLst>
               <p:ext uri="{D42A27DB-BD31-4B8C-83A1-F6EECF244321}">
-                <p14:modId xmlns:p14="http://schemas.microsoft.com/office/powerpoint/2010/main" val="1785897054"/>
+                <p14:modId xmlns:p14="http://schemas.microsoft.com/office/powerpoint/2010/main" val="3680497098"/>
               </p:ext>
             </p:extLst>
           </p:nvPr>
@@ -20588,7 +20573,7 @@
                       <a:pPr algn="l"/>
                       <a:r>
                         <a:rPr lang="en-US" sz="1600" dirty="0"/>
-                        <a:t>Identification of Objects within Images</a:t>
+                        <a:t>Identification of objects within images</a:t>
                       </a:r>
                     </a:p>
                   </a:txBody>
@@ -20623,7 +20608,7 @@
                       <a:pPr algn="l"/>
                       <a:r>
                         <a:rPr lang="en-US" sz="1600" dirty="0"/>
-                        <a:t>Classification of Images as one of n classes</a:t>
+                        <a:t>Classification of images as one of n classes</a:t>
                       </a:r>
                     </a:p>
                   </a:txBody>
@@ -20658,7 +20643,7 @@
                       <a:pPr algn="l"/>
                       <a:r>
                         <a:rPr lang="en-US" sz="1600" dirty="0"/>
-                        <a:t>Identifying Text as one of n classes</a:t>
+                        <a:t>Identifying text as one of n classes</a:t>
                       </a:r>
                     </a:p>
                   </a:txBody>
@@ -20693,7 +20678,7 @@
                       <a:pPr algn="l"/>
                       <a:r>
                         <a:rPr lang="en-US" sz="1600" dirty="0"/>
-                        <a:t>Predict User-item relationship</a:t>
+                        <a:t>Predict user-item relationship</a:t>
                       </a:r>
                     </a:p>
                   </a:txBody>
@@ -20802,7 +20787,7 @@
           <a:p>
             <a:r>
               <a:rPr lang="en-US" dirty="0"/>
-              <a:t>Analytics Zoo provides a collection of pre-trained models for Object Detection</a:t>
+              <a:t>Analytics Zoo provides a collection of pre-trained models for object detection</a:t>
             </a:r>
           </a:p>
           <a:p>
@@ -20814,7 +20799,7 @@
           <a:p>
             <a:r>
               <a:rPr lang="en-US" dirty="0"/>
-              <a:t>Two typical kind of pre-trained Object Detection models: SSD and Faster RCNN-supported models</a:t>
+              <a:t>Two typical types of pre-trained object detection models: SSD and Faster RCNN-supported models</a:t>
             </a:r>
           </a:p>
           <a:p>
@@ -22029,13 +22014,7 @@
           <a:p>
             <a:r>
               <a:rPr lang="en-IN" dirty="0"/>
-              <a:t>Analytics Zoo provides a collection of pre-trained models for Image Classification</a:t>
-            </a:r>
-          </a:p>
-          <a:p>
-            <a:r>
-              <a:rPr lang="en-IN" dirty="0"/>
-              <a:t>Provided models:</a:t>
+              <a:t>Analytics Zoo provides a collection of pre-trained models for image classification, including:</a:t>
             </a:r>
           </a:p>
           <a:p>
@@ -22096,7 +22075,10 @@
               </a:rPr>
               <a:t>here</a:t>
             </a:r>
-            <a:endParaRPr lang="en-IN" dirty="0"/>
+            <a:r>
+              <a:rPr lang="en-IN" dirty="0"/>
+              <a:t>.</a:t>
+            </a:r>
           </a:p>
         </p:txBody>
       </p:sp>
@@ -22186,20 +22168,43 @@
           <a:bodyPr/>
           <a:lstStyle/>
           <a:p>
-            <a:br>
+            <a:r>
               <a:rPr lang="en-US" dirty="0"/>
-            </a:br>
-            <a:r>
-              <a:rPr lang="en-US" dirty="0"/>
-              <a:t>Analytics zoo</a:t>
-            </a:r>
-            <a:br>
-              <a:rPr lang="en-US" dirty="0"/>
-            </a:br>
-            <a:endParaRPr lang="en-US" dirty="0"/>
+              <a:t>Introduction</a:t>
+            </a:r>
           </a:p>
         </p:txBody>
       </p:sp>
+      <p:pic>
+        <p:nvPicPr>
+          <p:cNvPr id="4" name="Picture 3">
+            <a:extLst>
+              <a:ext uri="{FF2B5EF4-FFF2-40B4-BE49-F238E27FC236}">
+                <a16:creationId xmlns:a16="http://schemas.microsoft.com/office/drawing/2014/main" id="{29DB837A-C5C8-2E40-8844-39D5EC260E9D}"/>
+              </a:ext>
+            </a:extLst>
+          </p:cNvPr>
+          <p:cNvPicPr>
+            <a:picLocks noChangeAspect="1"/>
+          </p:cNvPicPr>
+          <p:nvPr/>
+        </p:nvPicPr>
+        <p:blipFill>
+          <a:blip r:embed="rId3"/>
+          <a:stretch>
+            <a:fillRect/>
+          </a:stretch>
+        </p:blipFill>
+        <p:spPr>
+          <a:xfrm>
+            <a:off x="3012585" y="137565"/>
+            <a:ext cx="3063289" cy="2106522"/>
+          </a:xfrm>
+          <a:prstGeom prst="rect">
+            <a:avLst/>
+          </a:prstGeom>
+        </p:spPr>
+      </p:pic>
     </p:spTree>
     <p:extLst>
       <p:ext uri="{BB962C8B-B14F-4D97-AF65-F5344CB8AC3E}">
@@ -22368,7 +22373,7 @@
           <a:p>
             <a:r>
               <a:rPr lang="en-US" dirty="0"/>
-              <a:t>Analytics Zoo provides pre-defined models having different encoders that can be used for classifying texts.</a:t>
+              <a:t>Analytics Zoo provides pre-defined models with different encoders that can be used for classifying texts.</a:t>
             </a:r>
           </a:p>
           <a:p>
@@ -22381,22 +22386,14 @@
             <a:pPr lvl="2"/>
             <a:r>
               <a:rPr lang="en-US" dirty="0"/>
-              <a:t>Easy-to-use models, could be fed into </a:t>
-            </a:r>
-            <a:r>
-              <a:rPr lang="en-US" dirty="0" err="1"/>
-              <a:t>NNFrames</a:t>
-            </a:r>
+              <a:t>Easy-to-use models could be fed into NNFrames or BigDL Optimizer for training</a:t>
+            </a:r>
+          </a:p>
+          <a:p>
+            <a:pPr lvl="2"/>
             <a:r>
               <a:rPr lang="en-US" dirty="0"/>
-              <a:t> or BigDL Optimizer for training</a:t>
-            </a:r>
-          </a:p>
-          <a:p>
-            <a:pPr lvl="2"/>
-            <a:r>
-              <a:rPr lang="en-US" dirty="0"/>
-              <a:t>The encoders we support include CNN, LSTM and GRU</a:t>
+              <a:t>The encoders we support include CNN, LSTM, and GRU</a:t>
             </a:r>
           </a:p>
           <a:p>
@@ -22539,7 +22536,7 @@
           <a:p>
             <a:r>
               <a:rPr lang="en-US" dirty="0"/>
-              <a:t>Text Classifier Sample Code</a:t>
+              <a:t>Text Classifier Sample Code (1 of 3)</a:t>
             </a:r>
             <a:endParaRPr lang="en-IN" dirty="0"/>
           </a:p>
@@ -22610,7 +22607,7 @@
           <a:p>
             <a:r>
               <a:rPr lang="en-US" dirty="0"/>
-              <a:t>Text Classifier Sample Code</a:t>
+              <a:t>Text Classifier Sample Code (2 of 3)</a:t>
             </a:r>
             <a:endParaRPr lang="en-IN" dirty="0"/>
           </a:p>
@@ -23833,7 +23830,7 @@
           <a:p>
             <a:r>
               <a:rPr lang="en-US" dirty="0"/>
-              <a:t>Text Classifier Sample Code</a:t>
+              <a:t>Text Classifier Sample Code (3 of 3)</a:t>
             </a:r>
             <a:endParaRPr lang="en-IN" dirty="0"/>
           </a:p>
@@ -24492,7 +24489,7 @@
           <a:p>
             <a:r>
               <a:rPr lang="en-US" dirty="0"/>
-              <a:t>Analytics Zoo provides two Recommender models, including Wide and Deep (WND) learning model and Neural network-based Collaborative Filtering (NCF) model.</a:t>
+              <a:t>Analytics Zoo provides two Recommender models: Wide and Deep (WND) learning model and Neural network-based Collaborative Filtering (NCF) model.</a:t>
             </a:r>
           </a:p>
           <a:p>
@@ -24505,15 +24502,7 @@
             <a:pPr lvl="2"/>
             <a:r>
               <a:rPr lang="en-US" dirty="0"/>
-              <a:t>Easy-to-use models, could be fed into </a:t>
-            </a:r>
-            <a:r>
-              <a:rPr lang="en-US" dirty="0" err="1"/>
-              <a:t>NNFrames</a:t>
-            </a:r>
-            <a:r>
-              <a:rPr lang="en-US" dirty="0"/>
-              <a:t> or BigDL Optimizer for training</a:t>
+              <a:t>Easy-to-use models, could be fed into NNFrames or BigDL Optimizer for training</a:t>
             </a:r>
           </a:p>
           <a:p>
@@ -24527,7 +24516,7 @@
             <a:pPr lvl="2"/>
             <a:r>
               <a:rPr lang="en-US" dirty="0"/>
-              <a:t>It provides three user-friendly APIs to predict user item pairs, and recommend items (users) for users (items)</a:t>
+              <a:t>They provide three user-friendly APIs to predict user item pairs and recommend items (users) for users (items)</a:t>
             </a:r>
           </a:p>
           <a:p>
@@ -24670,7 +24659,7 @@
           <a:p>
             <a:r>
               <a:rPr lang="en-US" dirty="0"/>
-              <a:t>Recommendation API Usage</a:t>
+              <a:t>Recommendation API Usage (1 of 2)</a:t>
             </a:r>
             <a:endParaRPr lang="en-IN" dirty="0"/>
           </a:p>
@@ -24741,7 +24730,7 @@
           <a:p>
             <a:r>
               <a:rPr lang="en-US" dirty="0"/>
-              <a:t>Recommendation API Usage</a:t>
+              <a:t>Recommendation API Usage (2 of 2)</a:t>
             </a:r>
             <a:endParaRPr lang="en-IN" dirty="0"/>
           </a:p>
@@ -25492,11 +25481,41 @@
           <a:p>
             <a:r>
               <a:rPr lang="en-US" dirty="0"/>
-              <a:t>Getting Started With Analytics Zoo</a:t>
+              <a:t>Getting Started</a:t>
             </a:r>
           </a:p>
         </p:txBody>
       </p:sp>
+      <p:pic>
+        <p:nvPicPr>
+          <p:cNvPr id="3" name="Picture 2">
+            <a:extLst>
+              <a:ext uri="{FF2B5EF4-FFF2-40B4-BE49-F238E27FC236}">
+                <a16:creationId xmlns:a16="http://schemas.microsoft.com/office/drawing/2014/main" id="{0B1D2B04-43A3-1947-AFDD-638B12CC275D}"/>
+              </a:ext>
+            </a:extLst>
+          </p:cNvPr>
+          <p:cNvPicPr>
+            <a:picLocks noChangeAspect="1"/>
+          </p:cNvPicPr>
+          <p:nvPr/>
+        </p:nvPicPr>
+        <p:blipFill>
+          <a:blip r:embed="rId3"/>
+          <a:stretch>
+            <a:fillRect/>
+          </a:stretch>
+        </p:blipFill>
+        <p:spPr>
+          <a:xfrm>
+            <a:off x="3012585" y="145657"/>
+            <a:ext cx="3063289" cy="2106522"/>
+          </a:xfrm>
+          <a:prstGeom prst="rect">
+            <a:avLst/>
+          </a:prstGeom>
+        </p:spPr>
+      </p:pic>
     </p:spTree>
     <p:extLst>
       <p:ext uri="{BB962C8B-B14F-4D97-AF65-F5344CB8AC3E}">
@@ -25579,7 +25598,15 @@
             </a:r>
             <a:r>
               <a:rPr lang="en-US" dirty="0"/>
-              <a:t> docker : </a:t>
+              <a:t> </a:t>
+            </a:r>
+            <a:r>
+              <a:rPr lang="en-US" dirty="0" err="1"/>
+              <a:t>docker</a:t>
+            </a:r>
+            <a:r>
+              <a:rPr lang="en-US" dirty="0"/>
+              <a:t>: </a:t>
             </a:r>
             <a:br>
               <a:rPr lang="en-US" dirty="0"/>
@@ -25599,14 +25626,16 @@
             </a:pPr>
             <a:r>
               <a:rPr lang="en-US" dirty="0"/>
-              <a:t>Community docker images</a:t>
-            </a:r>
-          </a:p>
-          <a:p>
-            <a:pPr marL="542576" lvl="1" indent="-285750">
-              <a:buFontTx/>
-              <a:buChar char="-"/>
-            </a:pPr>
+              <a:t>Community </a:t>
+            </a:r>
+            <a:r>
+              <a:rPr lang="en-US" dirty="0" err="1"/>
+              <a:t>docker</a:t>
+            </a:r>
+            <a:r>
+              <a:rPr lang="en-US" dirty="0"/>
+              <a:t> images:  </a:t>
+            </a:r>
             <a:r>
               <a:rPr lang="en-US" dirty="0">
                 <a:hlinkClick r:id="rId3"/>
@@ -26383,7 +26412,7 @@
           <a:p>
             <a:r>
               <a:rPr lang="en-IN" dirty="0"/>
-              <a:t>It brings together Apache Spark*, TensorFlow*, </a:t>
+              <a:t>Brings together Apache Spark*, TensorFlow*, </a:t>
             </a:r>
             <a:r>
               <a:rPr lang="en-IN" dirty="0" err="1"/>
@@ -26391,7 +26420,7 @@
             </a:r>
             <a:r>
               <a:rPr lang="en-IN" dirty="0"/>
-              <a:t>* and </a:t>
+              <a:t>*, and </a:t>
             </a:r>
             <a:r>
               <a:rPr lang="en-IN" dirty="0" err="1"/>
@@ -26430,16 +26459,13 @@
           <a:p>
             <a:r>
               <a:rPr lang="en-IN" dirty="0"/>
-              <a:t>Deep learning model development using TensorFlow* or </a:t>
+              <a:t>Deep learning model development using TensorFlow or </a:t>
             </a:r>
             <a:r>
               <a:rPr lang="en-IN" dirty="0" err="1"/>
               <a:t>Keras</a:t>
             </a:r>
-            <a:r>
-              <a:rPr lang="en-IN" dirty="0"/>
-              <a:t>*</a:t>
-            </a:r>
+            <a:endParaRPr lang="en-IN" dirty="0"/>
           </a:p>
           <a:p>
             <a:r>
@@ -26681,7 +26707,7 @@
           <a:p>
             <a:r>
               <a:rPr lang="en-US" dirty="0"/>
-              <a:t>Make sure the following env variables are set</a:t>
+              <a:t>Make sure the following env variables are set:</a:t>
             </a:r>
           </a:p>
           <a:p>
@@ -26701,15 +26727,19 @@
           <a:p>
             <a:r>
               <a:rPr lang="en-US" dirty="0"/>
-              <a:t>always first call </a:t>
-            </a:r>
-            <a:r>
-              <a:rPr lang="en-US" dirty="0" err="1"/>
+              <a:t>Always call </a:t>
+            </a:r>
+            <a:r>
+              <a:rPr lang="en-US" b="1" dirty="0" err="1"/>
               <a:t>init_nncontext</a:t>
             </a:r>
             <a:r>
+              <a:rPr lang="en-US" b="1" dirty="0"/>
+              <a:t>() </a:t>
+            </a:r>
+            <a:r>
               <a:rPr lang="en-US" dirty="0"/>
-              <a:t>() at the very beginning of the code.  This will create a </a:t>
+              <a:t>at the very beginning of the code.  This will create a </a:t>
             </a:r>
             <a:r>
               <a:rPr lang="en-US" dirty="0" err="1"/>
@@ -26717,7 +26747,15 @@
             </a:r>
             <a:r>
               <a:rPr lang="en-US" dirty="0"/>
-              <a:t> with optimized performance configuration and initialize the BigDL engine</a:t>
+              <a:t> with optimized performance configuration and initialize the </a:t>
+            </a:r>
+            <a:r>
+              <a:rPr lang="en-US" dirty="0" err="1"/>
+              <a:t>BigDL</a:t>
+            </a:r>
+            <a:r>
+              <a:rPr lang="en-US" dirty="0"/>
+              <a:t> engine.</a:t>
             </a:r>
           </a:p>
           <a:p>
@@ -26899,7 +26937,7 @@
           <a:p>
             <a:r>
               <a:rPr lang="en-US" dirty="0"/>
-              <a:t>Learned about:</a:t>
+              <a:t>The presentation described:</a:t>
             </a:r>
           </a:p>
           <a:p>
@@ -26917,7 +26955,7 @@
             </a:r>
             <a:r>
               <a:rPr lang="en-US" dirty="0"/>
-              <a:t> APIs in Apache Spark*</a:t>
+              <a:t> APIs in Apache Spark</a:t>
             </a:r>
           </a:p>
           <a:p>
@@ -27073,7 +27111,7 @@
             </a:pPr>
             <a:r>
               <a:rPr lang="en-US" dirty="0"/>
-              <a:t>Intel Analytics Zoo : </a:t>
+              <a:t>Intel® Analytics Zoo : </a:t>
             </a:r>
             <a:r>
               <a:rPr lang="en-US" dirty="0">
@@ -27094,16 +27132,9 @@
               <a:buFontTx/>
               <a:buChar char="-"/>
             </a:pPr>
-            <a:endParaRPr lang="en-US" dirty="0"/>
-          </a:p>
-          <a:p>
-            <a:pPr marL="285750" indent="-285750">
-              <a:buFontTx/>
-              <a:buChar char="-"/>
-            </a:pPr>
             <a:r>
               <a:rPr lang="en-US" dirty="0"/>
-              <a:t>Intel AI Academy : </a:t>
+              <a:t>Intel® AI Academy Home: </a:t>
             </a:r>
             <a:r>
               <a:rPr lang="en-US" dirty="0">
@@ -27127,13 +27158,10 @@
               <a:buFontTx/>
               <a:buChar char="-"/>
             </a:pPr>
-            <a:endParaRPr lang="en-US" dirty="0"/>
-          </a:p>
-          <a:p>
-            <a:pPr marL="285750" indent="-285750">
-              <a:buFontTx/>
-              <a:buChar char="-"/>
-            </a:pPr>
+            <a:r>
+              <a:rPr lang="en-US" dirty="0"/>
+              <a:t>Intel® AI Academy Library: </a:t>
+            </a:r>
             <a:r>
               <a:rPr lang="en-US" dirty="0">
                 <a:hlinkClick r:id="rId4">
@@ -27289,13 +27317,13 @@
           <a:p>
             <a:r>
               <a:rPr lang="en-US" b="1" u="sng" dirty="0"/>
-              <a:t>Standard Spark* jobs</a:t>
+              <a:t>Standard Spark jobs</a:t>
             </a:r>
           </a:p>
           <a:p>
             <a:r>
               <a:rPr lang="en-US" dirty="0"/>
-              <a:t>No changes to the Apache Spark* or Apache Hadoop* clusters needed</a:t>
+              <a:t>No changes to the Apache Spark or Apache Hadoop* clusters are needed</a:t>
             </a:r>
           </a:p>
           <a:p>
@@ -27307,7 +27335,7 @@
           <a:p>
             <a:r>
               <a:rPr lang="en-US" dirty="0"/>
-              <a:t>Each iteration of the training runs as a Spark* job</a:t>
+              <a:t>Each iteration of the training runs as a Spark job</a:t>
             </a:r>
           </a:p>
           <a:p>
@@ -27319,7 +27347,7 @@
           <a:p>
             <a:r>
               <a:rPr lang="en-US" dirty="0"/>
-              <a:t>Each Spark* task runs the same model on a subset of the data (batch)</a:t>
+              <a:t>Each Spark task runs the same model on a subset of the data (batch)</a:t>
             </a:r>
           </a:p>
           <a:p>
@@ -27427,7 +27455,7 @@
           <a:p>
             <a:r>
               <a:rPr lang="en-US" dirty="0"/>
-              <a:t>Analytics Zoo &amp; Apache Spark*</a:t>
+              <a:t>Analytics Zoo &amp; Apache Spark</a:t>
             </a:r>
             <a:endParaRPr lang="en-IN" dirty="0"/>
           </a:p>
@@ -27968,16 +27996,16 @@
           <a:lstStyle/>
           <a:p>
             <a:br>
-              <a:rPr lang="en-IN" dirty="0"/>
+              <a:rPr lang="en-IN" sz="3200" dirty="0"/>
             </a:br>
             <a:r>
-              <a:rPr lang="en-IN" dirty="0"/>
-              <a:t>Analytics Zoo &amp; Apache Spark*</a:t>
+              <a:rPr lang="en-IN" sz="3200" dirty="0"/>
+              <a:t>Analytics Zoo &amp; Apache Spark scheduling</a:t>
             </a:r>
             <a:br>
-              <a:rPr lang="en-IN" dirty="0"/>
+              <a:rPr lang="en-IN" sz="3200" dirty="0"/>
             </a:br>
-            <a:endParaRPr lang="en-IN" dirty="0"/>
+            <a:endParaRPr lang="en-IN" sz="3200" dirty="0"/>
           </a:p>
         </p:txBody>
       </p:sp>
@@ -28066,7 +28094,7 @@
                   <a:cs typeface="Helvetica"/>
                   <a:sym typeface="Intel Clear"/>
                 </a:rPr>
-                <a:t>Apache Spark*</a:t>
+                <a:t>Apache Spark</a:t>
               </a:r>
             </a:p>
             <a:p>
@@ -28341,7 +28369,52 @@
                   <a:cs typeface="Helvetica"/>
                   <a:sym typeface="Intel Clear"/>
                 </a:rPr>
-                <a:t>zoo-python*.zip</a:t>
+                <a:t>zoo-</a:t>
+              </a:r>
+              <a:r>
+                <a:rPr kumimoji="0" lang="en-US" sz="1200" b="0" i="0" u="none" strike="noStrike" kern="0" cap="none" spc="0" normalizeH="0" baseline="0" noProof="0" dirty="0" err="1">
+                  <a:ln>
+                    <a:noFill/>
+                  </a:ln>
+                  <a:solidFill>
+                    <a:srgbClr val="A7A7A7"/>
+                  </a:solidFill>
+                  <a:effectLst/>
+                  <a:uLnTx/>
+                  <a:uFillTx/>
+                  <a:latin typeface="Helvetica"/>
+                  <a:cs typeface="Helvetica"/>
+                  <a:sym typeface="Intel Clear"/>
+                </a:rPr>
+                <a:t>pytho</a:t>
+              </a:r>
+              <a:r>
+                <a:rPr lang="en-US" sz="1200" kern="0" dirty="0">
+                  <a:solidFill>
+                    <a:srgbClr val="A7A7A7"/>
+                  </a:solidFill>
+                  <a:latin typeface="Helvetica"/>
+                  <a:cs typeface="Helvetica"/>
+                  <a:sym typeface="Intel Clear"/>
+                </a:rPr>
+                <a:t>n</a:t>
+              </a:r>
+              <a:r>
+                <a:rPr kumimoji="0" lang="en-US" sz="1200" b="0" i="0" u="none" strike="noStrike" kern="0" cap="none" spc="0" normalizeH="0" baseline="0" noProof="0" dirty="0">
+                  <a:ln>
+                    <a:noFill/>
+                  </a:ln>
+                  <a:solidFill>
+                    <a:srgbClr val="A7A7A7"/>
+                  </a:solidFill>
+                  <a:effectLst/>
+                  <a:uLnTx/>
+                  <a:uFillTx/>
+                  <a:latin typeface="Helvetica"/>
+                  <a:cs typeface="Helvetica"/>
+                  <a:sym typeface="Intel Clear"/>
+                </a:rPr>
+                <a:t>.zip</a:t>
               </a:r>
             </a:p>
           </p:txBody>
@@ -28411,7 +28484,7 @@
                   <a:cs typeface="Helvetica"/>
                   <a:sym typeface="Intel Clear"/>
                 </a:rPr>
-                <a:t>your python* file</a:t>
+                <a:t>your Python file</a:t>
               </a:r>
             </a:p>
           </p:txBody>
@@ -28467,7 +28540,7 @@
                 <a:defRPr/>
               </a:pPr>
               <a:r>
-                <a:rPr kumimoji="0" lang="en-US" sz="1050" b="0" i="0" u="none" strike="noStrike" kern="0" cap="none" spc="0" normalizeH="0" baseline="0" noProof="0" dirty="0">
+                <a:rPr kumimoji="0" lang="en-US" sz="700" b="0" i="0" u="none" strike="noStrike" kern="0" cap="none" spc="0" normalizeH="0" baseline="0" noProof="0" dirty="0">
                   <a:ln>
                     <a:noFill/>
                   </a:ln>
@@ -28483,7 +28556,58 @@
                   <a:cs typeface="Helvetica"/>
                   <a:sym typeface="Intel Clear"/>
                 </a:rPr>
-                <a:t>MKL* native lib</a:t>
+                <a:t>Intel</a:t>
+              </a:r>
+              <a:r>
+                <a:rPr lang="en-US" sz="700" kern="0" baseline="30000" dirty="0">
+                  <a:solidFill>
+                    <a:srgbClr val="0071C5">
+                      <a:lumMod val="75000"/>
+                    </a:srgbClr>
+                  </a:solidFill>
+                  <a:latin typeface="Helvetica"/>
+                  <a:cs typeface="Helvetica"/>
+                  <a:sym typeface="Intel Clear"/>
+                </a:rPr>
+                <a:t>(R)</a:t>
+              </a:r>
+              <a:r>
+                <a:rPr kumimoji="0" lang="en-US" sz="700" b="0" i="0" u="none" strike="noStrike" kern="0" cap="none" spc="0" normalizeH="0" baseline="0" noProof="0" dirty="0">
+                  <a:ln>
+                    <a:noFill/>
+                  </a:ln>
+                  <a:solidFill>
+                    <a:srgbClr val="0071C5">
+                      <a:lumMod val="75000"/>
+                    </a:srgbClr>
+                  </a:solidFill>
+                  <a:effectLst/>
+                  <a:uLnTx/>
+                  <a:uFillTx/>
+                  <a:latin typeface="Helvetica"/>
+                  <a:cs typeface="Helvetica"/>
+                  <a:sym typeface="Intel Clear"/>
+                </a:rPr>
+                <a:t> MKL* </a:t>
+              </a:r>
+              <a:r>
+                <a:rPr kumimoji="0" lang="en-US" sz="900" b="0" i="0" u="none" strike="noStrike" kern="0" cap="none" spc="0" normalizeH="0" baseline="0" noProof="0" dirty="0">
+                  <a:ln>
+                    <a:noFill/>
+                  </a:ln>
+                  <a:solidFill>
+                    <a:srgbClr val="0071C5">
+                      <a:lumMod val="75000"/>
+                    </a:srgbClr>
+                  </a:solidFill>
+                  <a:effectLst/>
+                  <a:uLnTx/>
+                  <a:uFillTx/>
+                  <a:latin typeface="Helvetica"/>
+                  <a:cs typeface="Helvetica"/>
+                  <a:sym typeface="Intel Clear"/>
+                </a:rPr>
+                <a:t>native lib</a:t>
               </a:r>
             </a:p>
           </p:txBody>
@@ -28721,7 +28845,7 @@
             </a:br>
             <a:r>
               <a:rPr lang="en-US" dirty="0"/>
-              <a:t>Analytics Zoo Features</a:t>
+              <a:t>Features</a:t>
             </a:r>
             <a:br>
               <a:rPr lang="en-US" dirty="0"/>
@@ -28730,6 +28854,36 @@
           </a:p>
         </p:txBody>
       </p:sp>
+      <p:pic>
+        <p:nvPicPr>
+          <p:cNvPr id="3" name="Picture 2">
+            <a:extLst>
+              <a:ext uri="{FF2B5EF4-FFF2-40B4-BE49-F238E27FC236}">
+                <a16:creationId xmlns:a16="http://schemas.microsoft.com/office/drawing/2014/main" id="{6B5F640E-2B47-E443-B629-48A8E7F0AA0F}"/>
+              </a:ext>
+            </a:extLst>
+          </p:cNvPr>
+          <p:cNvPicPr>
+            <a:picLocks noChangeAspect="1"/>
+          </p:cNvPicPr>
+          <p:nvPr/>
+        </p:nvPicPr>
+        <p:blipFill>
+          <a:blip r:embed="rId3"/>
+          <a:stretch>
+            <a:fillRect/>
+          </a:stretch>
+        </p:blipFill>
+        <p:spPr>
+          <a:xfrm>
+            <a:off x="3012585" y="137565"/>
+            <a:ext cx="3063289" cy="2106522"/>
+          </a:xfrm>
+          <a:prstGeom prst="rect">
+            <a:avLst/>
+          </a:prstGeom>
+        </p:spPr>
+      </p:pic>
     </p:spTree>
     <p:extLst>
       <p:ext uri="{BB962C8B-B14F-4D97-AF65-F5344CB8AC3E}">
@@ -28795,15 +28949,7 @@
           <a:p>
             <a:r>
               <a:rPr lang="en-US" dirty="0"/>
-              <a:t>Distributed </a:t>
-            </a:r>
-            <a:r>
-              <a:rPr lang="en-US" dirty="0" err="1"/>
-              <a:t>Tensorflow</a:t>
-            </a:r>
-            <a:r>
-              <a:rPr lang="en-US" dirty="0"/>
-              <a:t>* and </a:t>
+              <a:t>Distributed TensorFlow and </a:t>
             </a:r>
             <a:r>
               <a:rPr lang="en-US" dirty="0" err="1"/>
@@ -28811,35 +28957,19 @@
             </a:r>
             <a:r>
               <a:rPr lang="en-US" dirty="0"/>
-              <a:t>* on Apache Spark*/BigDL</a:t>
+              <a:t> on Apache Spark/BigDL</a:t>
             </a:r>
           </a:p>
           <a:p>
             <a:r>
               <a:rPr lang="en-US" dirty="0"/>
-              <a:t>High-level abstractions and APIs (</a:t>
-            </a:r>
-            <a:r>
-              <a:rPr lang="en-US" dirty="0" err="1"/>
-              <a:t>Keras</a:t>
-            </a:r>
+              <a:t>High-level abstractions and APIs (Keras style)</a:t>
+            </a:r>
+          </a:p>
+          <a:p>
             <a:r>
               <a:rPr lang="en-US" dirty="0"/>
-              <a:t> style)</a:t>
-            </a:r>
-          </a:p>
-          <a:p>
-            <a:r>
-              <a:rPr lang="en-US" dirty="0"/>
-              <a:t>Native DL support for Spark </a:t>
-            </a:r>
-            <a:r>
-              <a:rPr lang="en-US" dirty="0" err="1"/>
-              <a:t>DataFrames</a:t>
-            </a:r>
-            <a:r>
-              <a:rPr lang="en-US" dirty="0"/>
-              <a:t> and ML Pipelines</a:t>
+              <a:t>Native DL support for Spark DataFrames and ML Pipelines</a:t>
             </a:r>
           </a:p>
           <a:p>
@@ -28857,29 +28987,13 @@
           <a:p>
             <a:r>
               <a:rPr lang="en-US" dirty="0"/>
-              <a:t>Model serving APIs (w/ </a:t>
-            </a:r>
-            <a:r>
-              <a:rPr lang="en-US" dirty="0" err="1"/>
-              <a:t>OpenVINO</a:t>
-            </a:r>
+              <a:t>Model serving APIs (w/ OpenVINO* support)</a:t>
+            </a:r>
+          </a:p>
+          <a:p>
             <a:r>
               <a:rPr lang="en-US" dirty="0"/>
-              <a:t> support)</a:t>
-            </a:r>
-          </a:p>
-          <a:p>
-            <a:r>
-              <a:rPr lang="en-US" dirty="0"/>
-              <a:t>	Support Web Services, Spark, Storm, </a:t>
-            </a:r>
-            <a:r>
-              <a:rPr lang="en-US" dirty="0" err="1"/>
-              <a:t>Flink</a:t>
-            </a:r>
-            <a:r>
-              <a:rPr lang="en-US" dirty="0"/>
-              <a:t>, Kafka, etc.</a:t>
+              <a:t>Support Web Services, Spark, Apache Storm*, Apache Flink*, Apache Kafka*, etc.</a:t>
             </a:r>
           </a:p>
           <a:p>
@@ -28913,7 +29027,7 @@
           <a:p>
             <a:r>
               <a:rPr lang="en-IN" dirty="0"/>
-              <a:t>Analytics Zoo Features (List)</a:t>
+              <a:t>Analytics Zoo Features</a:t>
             </a:r>
           </a:p>
         </p:txBody>
@@ -29013,51 +29127,31 @@
           <a:p>
             <a:r>
               <a:rPr lang="en-IN" dirty="0"/>
-              <a:t>Analytics provides </a:t>
-            </a:r>
-            <a:r>
-              <a:rPr lang="en-IN" dirty="0" err="1"/>
-              <a:t>DataFrame</a:t>
-            </a:r>
+              <a:t>Analytics Zoo provides DataFrame-based high-level API</a:t>
+            </a:r>
+          </a:p>
+          <a:p>
             <a:r>
               <a:rPr lang="en-IN" dirty="0"/>
-              <a:t>-based high-level API</a:t>
+              <a:t>Also supports native integration with Apache Spark ML Pipeline</a:t>
             </a:r>
           </a:p>
           <a:p>
             <a:r>
               <a:rPr lang="en-IN" dirty="0"/>
-              <a:t>Also supports native integration with Apache Spark* ML Pipeline</a:t>
+              <a:t>These are in NNFrames package in Analytics Zoo</a:t>
             </a:r>
           </a:p>
           <a:p>
             <a:r>
               <a:rPr lang="en-IN" dirty="0"/>
-              <a:t>These are in </a:t>
-            </a:r>
-            <a:r>
-              <a:rPr lang="en-IN" dirty="0" err="1"/>
-              <a:t>NNFrames</a:t>
-            </a:r>
+              <a:t>NNFrames provides both Python* and Scala* APIs</a:t>
+            </a:r>
+          </a:p>
+          <a:p>
             <a:r>
               <a:rPr lang="en-IN" dirty="0"/>
-              <a:t> package</a:t>
-            </a:r>
-          </a:p>
-          <a:p>
-            <a:r>
-              <a:rPr lang="en-IN" dirty="0" err="1"/>
-              <a:t>NNFrames</a:t>
-            </a:r>
-            <a:r>
-              <a:rPr lang="en-IN" dirty="0"/>
-              <a:t> provides both Python* and Scala* APIs</a:t>
-            </a:r>
-          </a:p>
-          <a:p>
-            <a:r>
-              <a:rPr lang="en-IN" dirty="0"/>
-              <a:t>Compatible with Spark* v1.6 and v2.x</a:t>
+              <a:t>Compatible with Spark v1.6 and v2.x</a:t>
             </a:r>
           </a:p>
           <a:p>
@@ -29087,10 +29181,10 @@
           <a:lstStyle/>
           <a:p>
             <a:r>
-              <a:rPr lang="en-US" dirty="0"/>
-              <a:t>Zoo Features: High-level API</a:t>
-            </a:r>
-            <a:endParaRPr lang="en-IN" dirty="0"/>
+              <a:rPr lang="en-US" sz="3600" dirty="0"/>
+              <a:t>Analytics Zoo Features: High-level API</a:t>
+            </a:r>
+            <a:endParaRPr lang="en-IN" sz="3600" dirty="0"/>
           </a:p>
         </p:txBody>
       </p:sp>

</xml_diff>